<commit_message>
Estructura incial apartado dos
</commit_message>
<xml_diff>
--- a/01_best_practices/01_best_practices.pptx
+++ b/01_best_practices/01_best_practices.pptx
@@ -8174,12 +8174,13 @@
               <a:buAutoNum type="arabicPeriod"/>
             </a:pPr>
             <a:r>
-              <a:rPr lang="en-US">
+              <a:rPr lang="es-ES" altLang="en-US">
                 <a:solidFill>
                   <a:schemeClr val="bg1"/>
                 </a:solidFill>
+                <a:sym typeface="+mn-ea"/>
               </a:rPr>
-              <a:t>Observables</a:t>
+              <a:t>Flow Events</a:t>
             </a:r>
             <a:endParaRPr lang="en-US">
               <a:solidFill>
@@ -9589,7 +9590,10 @@
             </a:r>
             <a:endParaRPr lang="es-ES" altLang="en-US">
               <a:solidFill>
-                <a:schemeClr val="bg1"/>
+                <a:schemeClr val="accent4">
+                  <a:lumMod val="60000"/>
+                  <a:lumOff val="40000"/>
+                </a:schemeClr>
               </a:solidFill>
             </a:endParaRPr>
           </a:p>
@@ -9662,7 +9666,7 @@
             <a:r>
               <a:rPr lang="es-ES" altLang="en-US">
                 <a:solidFill>
-                  <a:schemeClr val="bg1"/>
+                  <a:srgbClr val="FFFF00"/>
                 </a:solidFill>
                 <a:sym typeface="+mn-ea"/>
               </a:rPr>

</xml_diff>

<commit_message>
Rellenar resentacion apartado uno
</commit_message>
<xml_diff>
--- a/01_best_practices/01_best_practices.pptx
+++ b/01_best_practices/01_best_practices.pptx
@@ -7,35 +7,37 @@
     <p:sldMasterId id="2147483670" r:id="rId4"/>
   </p:sldMasterIdLst>
   <p:notesMasterIdLst>
-    <p:notesMasterId r:id="rId31"/>
+    <p:notesMasterId r:id="rId33"/>
   </p:notesMasterIdLst>
   <p:sldIdLst>
     <p:sldId id="314" r:id="rId5"/>
     <p:sldId id="485" r:id="rId6"/>
     <p:sldId id="484" r:id="rId7"/>
     <p:sldId id="516" r:id="rId8"/>
-    <p:sldId id="494" r:id="rId9"/>
-    <p:sldId id="486" r:id="rId10"/>
-    <p:sldId id="496" r:id="rId11"/>
-    <p:sldId id="472" r:id="rId12"/>
-    <p:sldId id="477" r:id="rId13"/>
-    <p:sldId id="478" r:id="rId14"/>
-    <p:sldId id="479" r:id="rId15"/>
-    <p:sldId id="475" r:id="rId16"/>
-    <p:sldId id="476" r:id="rId17"/>
-    <p:sldId id="480" r:id="rId18"/>
-    <p:sldId id="482" r:id="rId19"/>
-    <p:sldId id="483" r:id="rId20"/>
-    <p:sldId id="517" r:id="rId21"/>
-    <p:sldId id="520" r:id="rId22"/>
-    <p:sldId id="489" r:id="rId23"/>
-    <p:sldId id="490" r:id="rId24"/>
-    <p:sldId id="491" r:id="rId25"/>
-    <p:sldId id="492" r:id="rId26"/>
-    <p:sldId id="518" r:id="rId27"/>
-    <p:sldId id="519" r:id="rId28"/>
-    <p:sldId id="465" r:id="rId29"/>
-    <p:sldId id="464" r:id="rId30"/>
+    <p:sldId id="486" r:id="rId9"/>
+    <p:sldId id="540" r:id="rId10"/>
+    <p:sldId id="494" r:id="rId11"/>
+    <p:sldId id="496" r:id="rId12"/>
+    <p:sldId id="472" r:id="rId13"/>
+    <p:sldId id="483" r:id="rId14"/>
+    <p:sldId id="542" r:id="rId15"/>
+    <p:sldId id="541" r:id="rId16"/>
+    <p:sldId id="477" r:id="rId17"/>
+    <p:sldId id="478" r:id="rId18"/>
+    <p:sldId id="479" r:id="rId19"/>
+    <p:sldId id="475" r:id="rId20"/>
+    <p:sldId id="476" r:id="rId21"/>
+    <p:sldId id="480" r:id="rId22"/>
+    <p:sldId id="482" r:id="rId23"/>
+    <p:sldId id="517" r:id="rId24"/>
+    <p:sldId id="489" r:id="rId25"/>
+    <p:sldId id="490" r:id="rId26"/>
+    <p:sldId id="491" r:id="rId27"/>
+    <p:sldId id="492" r:id="rId28"/>
+    <p:sldId id="518" r:id="rId29"/>
+    <p:sldId id="519" r:id="rId30"/>
+    <p:sldId id="465" r:id="rId31"/>
+    <p:sldId id="464" r:id="rId32"/>
   </p:sldIdLst>
   <p:sldSz cx="12192000" cy="6858000"/>
   <p:notesSz cx="6858000" cy="9144000"/>
@@ -6904,7 +6906,7 @@
           <a:p>
             <a:r>
               <a:rPr lang="en-US"/>
-              <a:t>Rule: max-line-length</a:t>
+              <a:t>Rule: member-ordering</a:t>
             </a:r>
             <a:endParaRPr lang="en-US"/>
           </a:p>
@@ -6918,8 +6920,8 @@
         </p:nvSpPr>
         <p:spPr>
           <a:xfrm>
-            <a:off x="299085" y="1540510"/>
-            <a:ext cx="6065520" cy="829945"/>
+            <a:off x="299085" y="1543685"/>
+            <a:ext cx="5852795" cy="460375"/>
           </a:xfrm>
           <a:prstGeom prst="rect">
             <a:avLst/>
@@ -6933,11 +6935,8 @@
           <a:p>
             <a:r>
               <a:rPr lang="en-US"/>
-              <a:t>Requires lines to be under a certain max length.</a:t>
-            </a:r>
-            <a:endParaRPr lang="en-US"/>
-          </a:p>
-          <a:p>
+              <a:t>Enforces member ordering.</a:t>
+            </a:r>
             <a:endParaRPr lang="en-US"/>
           </a:p>
         </p:txBody>
@@ -6950,8 +6949,8 @@
         </p:nvSpPr>
         <p:spPr>
           <a:xfrm>
-            <a:off x="299085" y="4556125"/>
-            <a:ext cx="11647805" cy="829945"/>
+            <a:off x="299085" y="3994150"/>
+            <a:ext cx="11784965" cy="1938020"/>
           </a:xfrm>
           <a:prstGeom prst="rect">
             <a:avLst/>
@@ -6965,12 +6964,70 @@
           <a:p>
             <a:r>
               <a:rPr lang="en-US"/>
-              <a:t>Limiting the length of a line of code improves code readability. It also makes comparing code side-by-side easier and improves compatibility with various editors, IDEs, and diff viewers.</a:t>
+              <a:t>A consistent ordering for class members can make classes easier to read, navigate, and edit.</a:t>
             </a:r>
             <a:endParaRPr lang="en-US"/>
           </a:p>
-        </p:txBody>
-      </p:sp>
+          <a:p>
+            <a:endParaRPr lang="en-US"/>
+          </a:p>
+          <a:p>
+            <a:r>
+              <a:rPr lang="en-US"/>
+              <a:t>A common opposite practice to member-ordering is to keep related groups of classes together. Instead of creating classes with multiple separate groups, consider splitting class responsibilities apart across multiple single-responsibility classes.</a:t>
+            </a:r>
+            <a:endParaRPr lang="en-US"/>
+          </a:p>
+        </p:txBody>
+      </p:sp>
+      <p:pic>
+        <p:nvPicPr>
+          <p:cNvPr id="6" name="Picture 5"/>
+          <p:cNvPicPr>
+            <a:picLocks noChangeAspect="1"/>
+          </p:cNvPicPr>
+          <p:nvPr/>
+        </p:nvPicPr>
+        <p:blipFill>
+          <a:blip r:embed="rId1"/>
+          <a:stretch>
+            <a:fillRect/>
+          </a:stretch>
+        </p:blipFill>
+        <p:spPr>
+          <a:xfrm>
+            <a:off x="1546860" y="2185670"/>
+            <a:ext cx="3733165" cy="1583055"/>
+          </a:xfrm>
+          <a:prstGeom prst="rect">
+            <a:avLst/>
+          </a:prstGeom>
+        </p:spPr>
+      </p:pic>
+      <p:pic>
+        <p:nvPicPr>
+          <p:cNvPr id="7" name="Picture 6"/>
+          <p:cNvPicPr>
+            <a:picLocks noChangeAspect="1"/>
+          </p:cNvPicPr>
+          <p:nvPr/>
+        </p:nvPicPr>
+        <p:blipFill>
+          <a:blip r:embed="rId2"/>
+          <a:stretch>
+            <a:fillRect/>
+          </a:stretch>
+        </p:blipFill>
+        <p:spPr>
+          <a:xfrm>
+            <a:off x="6982460" y="1543685"/>
+            <a:ext cx="2940050" cy="2225040"/>
+          </a:xfrm>
+          <a:prstGeom prst="rect">
+            <a:avLst/>
+          </a:prstGeom>
+        </p:spPr>
+      </p:pic>
     </p:spTree>
   </p:cSld>
   <p:clrMapOvr>
@@ -6988,14 +7045,7 @@
         <p:cNvGrpSpPr/>
         <p:nvPr/>
       </p:nvGrpSpPr>
-      <p:grpSpPr>
-        <a:xfrm>
-          <a:off x="0" y="0"/>
-          <a:ext cx="0" cy="0"/>
-          <a:chOff x="0" y="0"/>
-          <a:chExt cx="0" cy="0"/>
-        </a:xfrm>
-      </p:grpSpPr>
+      <p:grpSpPr/>
       <p:sp>
         <p:nvSpPr>
           <p:cNvPr id="2" name="Título 1"/>
@@ -7009,13 +7059,94 @@
         <p:spPr/>
         <p:txBody>
           <a:bodyPr/>
-          <a:lstStyle/>
-          <a:p>
-            <a:r>
-              <a:rPr lang="es-ES" dirty="0"/>
-              <a:t>Funcionalidad</a:t>
-            </a:r>
-            <a:endParaRPr lang="es-ES" dirty="0"/>
+          <a:p>
+            <a:r>
+              <a:rPr lang="es-ES" altLang="en-US">
+                <a:sym typeface="+mn-ea"/>
+              </a:rPr>
+              <a:t>TsLint</a:t>
+            </a:r>
+            <a:endParaRPr lang="es-ES" altLang="en-US"/>
+          </a:p>
+        </p:txBody>
+      </p:sp>
+      <p:sp>
+        <p:nvSpPr>
+          <p:cNvPr id="3" name="Marcador de posición de texto 2"/>
+          <p:cNvSpPr>
+            <a:spLocks noGrp="1"/>
+          </p:cNvSpPr>
+          <p:nvPr>
+            <p:ph type="body" sz="quarter" idx="13"/>
+          </p:nvPr>
+        </p:nvSpPr>
+        <p:spPr/>
+        <p:txBody>
+          <a:bodyPr/>
+          <a:p>
+            <a:r>
+              <a:rPr lang="es-ES" altLang="en-US"/>
+              <a:t>Rule: no-any</a:t>
+            </a:r>
+            <a:endParaRPr lang="es-ES" altLang="en-US"/>
+          </a:p>
+        </p:txBody>
+      </p:sp>
+      <p:sp>
+        <p:nvSpPr>
+          <p:cNvPr id="4" name="Cuadro de texto 3"/>
+          <p:cNvSpPr txBox="1"/>
+          <p:nvPr/>
+        </p:nvSpPr>
+        <p:spPr>
+          <a:xfrm>
+            <a:off x="577850" y="1889125"/>
+            <a:ext cx="5671185" cy="829945"/>
+          </a:xfrm>
+          <a:prstGeom prst="rect">
+            <a:avLst/>
+          </a:prstGeom>
+          <a:noFill/>
+        </p:spPr>
+        <p:txBody>
+          <a:bodyPr wrap="square" rtlCol="0" anchor="t">
+            <a:spAutoFit/>
+          </a:bodyPr>
+          <a:p>
+            <a:r>
+              <a:rPr lang="es-ES" altLang="en-US"/>
+              <a:t>Disallows usages of any as a type declaration.</a:t>
+            </a:r>
+            <a:endParaRPr lang="es-ES" altLang="en-US"/>
+          </a:p>
+        </p:txBody>
+      </p:sp>
+      <p:sp>
+        <p:nvSpPr>
+          <p:cNvPr id="5" name="Cuadro de texto 4"/>
+          <p:cNvSpPr txBox="1"/>
+          <p:nvPr/>
+        </p:nvSpPr>
+        <p:spPr>
+          <a:xfrm>
+            <a:off x="596265" y="3557270"/>
+            <a:ext cx="7457440" cy="829945"/>
+          </a:xfrm>
+          <a:prstGeom prst="rect">
+            <a:avLst/>
+          </a:prstGeom>
+          <a:noFill/>
+        </p:spPr>
+        <p:txBody>
+          <a:bodyPr wrap="square" rtlCol="0" anchor="t">
+            <a:spAutoFit/>
+          </a:bodyPr>
+          <a:p>
+            <a:r>
+              <a:rPr lang="es-ES" altLang="en-US"/>
+              <a:t>Using any as a type declaration nullifies the compile-time benefits of the type system.</a:t>
+            </a:r>
+            <a:endParaRPr lang="es-ES" altLang="en-US"/>
           </a:p>
         </p:txBody>
       </p:sp>
@@ -7036,10 +7167,17 @@
         <p:cNvGrpSpPr/>
         <p:nvPr/>
       </p:nvGrpSpPr>
-      <p:grpSpPr/>
-      <p:sp>
-        <p:nvSpPr>
-          <p:cNvPr id="2" name="Title 1"/>
+      <p:grpSpPr>
+        <a:xfrm>
+          <a:off x="0" y="0"/>
+          <a:ext cx="0" cy="0"/>
+          <a:chOff x="0" y="0"/>
+          <a:chExt cx="0" cy="0"/>
+        </a:xfrm>
+      </p:grpSpPr>
+      <p:sp>
+        <p:nvSpPr>
+          <p:cNvPr id="2" name="Título 1"/>
           <p:cNvSpPr>
             <a:spLocks noGrp="1"/>
           </p:cNvSpPr>
@@ -7047,52 +7185,34 @@
             <p:ph type="title"/>
           </p:nvPr>
         </p:nvSpPr>
-        <p:spPr/>
+        <p:spPr>
+          <a:xfrm>
+            <a:off x="3523615" y="2342515"/>
+            <a:ext cx="5145405" cy="859155"/>
+          </a:xfrm>
+        </p:spPr>
         <p:txBody>
           <a:bodyPr/>
-          <a:p>
-            <a:r>
-              <a:rPr lang="es-ES" altLang="en-US">
-                <a:sym typeface="+mn-ea"/>
-              </a:rPr>
-              <a:t>TsLint</a:t>
-            </a:r>
-            <a:endParaRPr lang="en-US"/>
-          </a:p>
-        </p:txBody>
-      </p:sp>
-      <p:sp>
-        <p:nvSpPr>
-          <p:cNvPr id="3" name="Text Placeholder 2"/>
-          <p:cNvSpPr>
-            <a:spLocks noGrp="1"/>
-          </p:cNvSpPr>
-          <p:nvPr>
-            <p:ph type="body" sz="quarter" idx="13"/>
-          </p:nvPr>
-        </p:nvSpPr>
-        <p:spPr/>
-        <p:txBody>
-          <a:bodyPr/>
-          <a:p>
-            <a:r>
-              <a:rPr lang="en-US"/>
-              <a:t>Rule: curly</a:t>
-            </a:r>
-            <a:endParaRPr lang="en-US"/>
-          </a:p>
-        </p:txBody>
-      </p:sp>
-      <p:sp>
-        <p:nvSpPr>
-          <p:cNvPr id="4" name="Text Box 3"/>
+          <a:lstStyle/>
+          <a:p>
+            <a:r>
+              <a:rPr lang="es-ES" dirty="0" err="1"/>
+              <a:t>Maintainability</a:t>
+            </a:r>
+            <a:endParaRPr lang="es-ES" dirty="0" err="1"/>
+          </a:p>
+        </p:txBody>
+      </p:sp>
+      <p:sp>
+        <p:nvSpPr>
+          <p:cNvPr id="3" name="Cuadro de texto 2"/>
           <p:cNvSpPr txBox="1"/>
           <p:nvPr/>
         </p:nvSpPr>
         <p:spPr>
           <a:xfrm>
-            <a:off x="2480310" y="2524760"/>
-            <a:ext cx="2540000" cy="1198880"/>
+            <a:off x="1800860" y="5325110"/>
+            <a:ext cx="5664200" cy="460375"/>
           </a:xfrm>
           <a:prstGeom prst="rect">
             <a:avLst/>
@@ -7105,86 +7225,18 @@
           </a:bodyPr>
           <a:p>
             <a:r>
-              <a:rPr lang="en-US"/>
-              <a:t>if (foo === bar)</a:t>
-            </a:r>
-            <a:endParaRPr lang="en-US"/>
-          </a:p>
-          <a:p>
-            <a:r>
-              <a:rPr lang="en-US"/>
-              <a:t>    foo++;</a:t>
-            </a:r>
-            <a:endParaRPr lang="en-US"/>
-          </a:p>
-          <a:p>
-            <a:r>
-              <a:rPr lang="en-US"/>
-              <a:t>    bar++;</a:t>
-            </a:r>
-            <a:endParaRPr lang="en-US"/>
-          </a:p>
-        </p:txBody>
-      </p:sp>
-      <p:sp>
-        <p:nvSpPr>
-          <p:cNvPr id="6" name="Text Box 5"/>
-          <p:cNvSpPr txBox="1"/>
-          <p:nvPr/>
-        </p:nvSpPr>
-        <p:spPr>
-          <a:xfrm>
-            <a:off x="534670" y="1636395"/>
-            <a:ext cx="7231380" cy="460375"/>
-          </a:xfrm>
-          <a:prstGeom prst="rect">
-            <a:avLst/>
-          </a:prstGeom>
-          <a:noFill/>
-        </p:spPr>
-        <p:txBody>
-          <a:bodyPr wrap="square" rtlCol="0" anchor="t">
-            <a:spAutoFit/>
-          </a:bodyPr>
-          <a:p>
-            <a:r>
-              <a:rPr lang="es-ES" altLang="en-US"/>
-              <a:t>En</a:t>
-            </a:r>
-            <a:r>
-              <a:rPr lang="en-US"/>
-              <a:t>forces braces for if/for/do/while statements</a:t>
-            </a:r>
-            <a:endParaRPr lang="en-US"/>
-          </a:p>
-        </p:txBody>
-      </p:sp>
-      <p:sp>
-        <p:nvSpPr>
-          <p:cNvPr id="7" name="Text Box 6"/>
-          <p:cNvSpPr txBox="1"/>
-          <p:nvPr/>
-        </p:nvSpPr>
-        <p:spPr>
-          <a:xfrm>
-            <a:off x="622935" y="4232275"/>
-            <a:ext cx="11252200" cy="1198880"/>
-          </a:xfrm>
-          <a:prstGeom prst="rect">
-            <a:avLst/>
-          </a:prstGeom>
-          <a:noFill/>
-        </p:spPr>
-        <p:txBody>
-          <a:bodyPr wrap="square" rtlCol="0" anchor="t">
-            <a:spAutoFit/>
-          </a:bodyPr>
-          <a:p>
-            <a:r>
-              <a:rPr lang="en-US"/>
-              <a:t>In the code above, the author almost certainly meant for both foo++ and bar++ to be executed only if foo === bar. However, they forgot braces and bar++ will be executed no matter what. This rule could prevent such a mistake.</a:t>
-            </a:r>
-            <a:endParaRPr lang="en-US"/>
+              <a:rPr lang="es-ES" altLang="en-US">
+                <a:solidFill>
+                  <a:schemeClr val="bg1"/>
+                </a:solidFill>
+              </a:rPr>
+              <a:t>These rules make code maintenance easier</a:t>
+            </a:r>
+            <a:endParaRPr lang="es-ES" altLang="en-US">
+              <a:solidFill>
+                <a:schemeClr val="bg1"/>
+              </a:solidFill>
+            </a:endParaRPr>
           </a:p>
         </p:txBody>
       </p:sp>
@@ -7216,22 +7268,15 @@
             <p:ph type="title"/>
           </p:nvPr>
         </p:nvSpPr>
-        <p:spPr>
-          <a:xfrm>
-            <a:off x="299401" y="85261"/>
-            <a:ext cx="8051577" cy="659096"/>
-          </a:xfrm>
-        </p:spPr>
+        <p:spPr/>
         <p:txBody>
           <a:bodyPr/>
           <a:p>
             <a:r>
-              <a:rPr lang="es-ES" altLang="en-US">
-                <a:sym typeface="+mn-ea"/>
-              </a:rPr>
+              <a:rPr lang="es-ES" altLang="en-US"/>
               <a:t>TsLint</a:t>
             </a:r>
-            <a:endParaRPr lang="en-US"/>
+            <a:endParaRPr lang="es-ES" altLang="en-US"/>
           </a:p>
         </p:txBody>
       </p:sp>
@@ -7245,18 +7290,13 @@
             <p:ph type="body" sz="quarter" idx="13"/>
           </p:nvPr>
         </p:nvSpPr>
-        <p:spPr>
-          <a:xfrm>
-            <a:off x="299400" y="744522"/>
-            <a:ext cx="6228401" cy="513014"/>
-          </a:xfrm>
-        </p:spPr>
+        <p:spPr/>
         <p:txBody>
           <a:bodyPr/>
           <a:p>
             <a:r>
               <a:rPr lang="en-US"/>
-              <a:t>Rule: import-blacklist</a:t>
+              <a:t>Rule: indent</a:t>
             </a:r>
             <a:endParaRPr lang="en-US"/>
           </a:p>
@@ -7270,8 +7310,8 @@
         </p:nvSpPr>
         <p:spPr>
           <a:xfrm>
-            <a:off x="299085" y="1866265"/>
-            <a:ext cx="6622415" cy="1198880"/>
+            <a:off x="299085" y="1466215"/>
+            <a:ext cx="5920740" cy="460375"/>
           </a:xfrm>
           <a:prstGeom prst="rect">
             <a:avLst/>
@@ -7285,7 +7325,7 @@
           <a:p>
             <a:r>
               <a:rPr lang="en-US"/>
-              <a:t>Disallows importing the specified modules directly via import and require. Instead only sub modules may be imported from that module.</a:t>
+              <a:t>Enforces indentation with tabs or spaces.</a:t>
             </a:r>
             <a:endParaRPr lang="en-US"/>
           </a:p>
@@ -7299,8 +7339,8 @@
         </p:nvSpPr>
         <p:spPr>
           <a:xfrm>
-            <a:off x="299085" y="3305175"/>
-            <a:ext cx="6089015" cy="1568450"/>
+            <a:off x="299085" y="4681220"/>
+            <a:ext cx="11640185" cy="829945"/>
           </a:xfrm>
           <a:prstGeom prst="rect">
             <a:avLst/>
@@ -7314,7 +7354,7 @@
           <a:p>
             <a:r>
               <a:rPr lang="en-US"/>
-              <a:t>Some libraries allow importing their submodules instead of the entire module. This is good practise as it avoids loading unused modules.</a:t>
+              <a:t>Using only one of tabs or spaces for indentation leads to more consistent editor behavior, cleaner diffs in version control, and easier programmatic manipulation.</a:t>
             </a:r>
             <a:endParaRPr lang="en-US"/>
           </a:p>
@@ -7337,17 +7377,10 @@
         <p:cNvGrpSpPr/>
         <p:nvPr/>
       </p:nvGrpSpPr>
-      <p:grpSpPr>
-        <a:xfrm>
-          <a:off x="0" y="0"/>
-          <a:ext cx="0" cy="0"/>
-          <a:chOff x="0" y="0"/>
-          <a:chExt cx="0" cy="0"/>
-        </a:xfrm>
-      </p:grpSpPr>
-      <p:sp>
-        <p:nvSpPr>
-          <p:cNvPr id="2" name="Título 1"/>
+      <p:grpSpPr/>
+      <p:sp>
+        <p:nvSpPr>
+          <p:cNvPr id="2" name="Title 1"/>
           <p:cNvSpPr>
             <a:spLocks noGrp="1"/>
           </p:cNvSpPr>
@@ -7357,19 +7390,98 @@
         </p:nvSpPr>
         <p:spPr/>
         <p:txBody>
-          <a:bodyPr>
-            <a:normAutofit fontScale="90000"/>
+          <a:bodyPr/>
+          <a:p>
+            <a:r>
+              <a:rPr lang="es-ES" altLang="en-US">
+                <a:sym typeface="+mn-ea"/>
+              </a:rPr>
+              <a:t>TsLint</a:t>
+            </a:r>
+            <a:endParaRPr lang="en-US"/>
+          </a:p>
+        </p:txBody>
+      </p:sp>
+      <p:sp>
+        <p:nvSpPr>
+          <p:cNvPr id="3" name="Text Placeholder 2"/>
+          <p:cNvSpPr>
+            <a:spLocks noGrp="1"/>
+          </p:cNvSpPr>
+          <p:nvPr>
+            <p:ph type="body" sz="quarter" idx="13"/>
+          </p:nvPr>
+        </p:nvSpPr>
+        <p:spPr/>
+        <p:txBody>
+          <a:bodyPr/>
+          <a:p>
+            <a:r>
+              <a:rPr lang="en-US"/>
+              <a:t>Rule: max-line-length</a:t>
+            </a:r>
+            <a:endParaRPr lang="en-US"/>
+          </a:p>
+        </p:txBody>
+      </p:sp>
+      <p:sp>
+        <p:nvSpPr>
+          <p:cNvPr id="4" name="Text Box 3"/>
+          <p:cNvSpPr txBox="1"/>
+          <p:nvPr/>
+        </p:nvSpPr>
+        <p:spPr>
+          <a:xfrm>
+            <a:off x="299085" y="1540510"/>
+            <a:ext cx="6065520" cy="829945"/>
+          </a:xfrm>
+          <a:prstGeom prst="rect">
+            <a:avLst/>
+          </a:prstGeom>
+          <a:noFill/>
+        </p:spPr>
+        <p:txBody>
+          <a:bodyPr wrap="square" rtlCol="0" anchor="t">
+            <a:spAutoFit/>
           </a:bodyPr>
-          <a:lstStyle/>
-          <a:p>
-            <a:r>
-              <a:rPr lang="es-ES" dirty="0"/>
-              <a:t>Diseño</a:t>
-            </a:r>
-            <a:br>
-              <a:rPr lang="es-ES" dirty="0"/>
-            </a:br>
-            <a:endParaRPr lang="es-ES" dirty="0"/>
+          <a:p>
+            <a:r>
+              <a:rPr lang="en-US"/>
+              <a:t>Requires lines to be under a certain max length.</a:t>
+            </a:r>
+            <a:endParaRPr lang="en-US"/>
+          </a:p>
+          <a:p>
+            <a:endParaRPr lang="en-US"/>
+          </a:p>
+        </p:txBody>
+      </p:sp>
+      <p:sp>
+        <p:nvSpPr>
+          <p:cNvPr id="5" name="Text Box 4"/>
+          <p:cNvSpPr txBox="1"/>
+          <p:nvPr/>
+        </p:nvSpPr>
+        <p:spPr>
+          <a:xfrm>
+            <a:off x="299085" y="4556125"/>
+            <a:ext cx="11647805" cy="829945"/>
+          </a:xfrm>
+          <a:prstGeom prst="rect">
+            <a:avLst/>
+          </a:prstGeom>
+          <a:noFill/>
+        </p:spPr>
+        <p:txBody>
+          <a:bodyPr wrap="square" rtlCol="0" anchor="t">
+            <a:spAutoFit/>
+          </a:bodyPr>
+          <a:p>
+            <a:r>
+              <a:rPr lang="en-US"/>
+              <a:t>Limiting the length of a line of code improves code readability. It also makes comparing code side-by-side easier and improves compatibility with various editors, IDEs, and diff viewers.</a:t>
+            </a:r>
+            <a:endParaRPr lang="en-US"/>
           </a:p>
         </p:txBody>
       </p:sp>
@@ -7390,10 +7502,17 @@
         <p:cNvGrpSpPr/>
         <p:nvPr/>
       </p:nvGrpSpPr>
-      <p:grpSpPr/>
-      <p:sp>
-        <p:nvSpPr>
-          <p:cNvPr id="2" name="Title 1"/>
+      <p:grpSpPr>
+        <a:xfrm>
+          <a:off x="0" y="0"/>
+          <a:ext cx="0" cy="0"/>
+          <a:chOff x="0" y="0"/>
+          <a:chExt cx="0" cy="0"/>
+        </a:xfrm>
+      </p:grpSpPr>
+      <p:sp>
+        <p:nvSpPr>
+          <p:cNvPr id="2" name="Título 1"/>
           <p:cNvSpPr>
             <a:spLocks noGrp="1"/>
           </p:cNvSpPr>
@@ -7401,52 +7520,36 @@
             <p:ph type="title"/>
           </p:nvPr>
         </p:nvSpPr>
-        <p:spPr/>
-        <p:txBody>
-          <a:bodyPr/>
-          <a:p>
-            <a:r>
-              <a:rPr lang="es-ES" altLang="en-US">
-                <a:sym typeface="+mn-ea"/>
-              </a:rPr>
-              <a:t>TsLint</a:t>
-            </a:r>
-            <a:endParaRPr lang="en-US"/>
-          </a:p>
-        </p:txBody>
-      </p:sp>
-      <p:sp>
-        <p:nvSpPr>
-          <p:cNvPr id="3" name="Text Placeholder 2"/>
-          <p:cNvSpPr>
-            <a:spLocks noGrp="1"/>
-          </p:cNvSpPr>
-          <p:nvPr>
-            <p:ph type="body" sz="quarter" idx="13"/>
-          </p:nvPr>
-        </p:nvSpPr>
-        <p:spPr/>
-        <p:txBody>
-          <a:bodyPr/>
-          <a:p>
-            <a:r>
-              <a:rPr lang="en-US"/>
-              <a:t>Rule: max-file-line-count</a:t>
-            </a:r>
-            <a:endParaRPr lang="en-US"/>
-          </a:p>
-        </p:txBody>
-      </p:sp>
-      <p:sp>
-        <p:nvSpPr>
-          <p:cNvPr id="4" name="Text Box 3"/>
+        <p:spPr>
+          <a:xfrm>
+            <a:off x="3732530" y="2388870"/>
+            <a:ext cx="4725670" cy="859155"/>
+          </a:xfrm>
+        </p:spPr>
+        <p:txBody>
+          <a:bodyPr>
+            <a:normAutofit/>
+          </a:bodyPr>
+          <a:lstStyle/>
+          <a:p>
+            <a:r>
+              <a:rPr lang="es-ES" dirty="0"/>
+              <a:t>Functionality</a:t>
+            </a:r>
+            <a:endParaRPr lang="es-ES" dirty="0"/>
+          </a:p>
+        </p:txBody>
+      </p:sp>
+      <p:sp>
+        <p:nvSpPr>
+          <p:cNvPr id="3" name="Cuadro de texto 2"/>
           <p:cNvSpPr txBox="1"/>
           <p:nvPr/>
         </p:nvSpPr>
         <p:spPr>
           <a:xfrm>
-            <a:off x="299085" y="1563370"/>
-            <a:ext cx="7071360" cy="460375"/>
+            <a:off x="1694180" y="5200015"/>
+            <a:ext cx="8803005" cy="829945"/>
           </a:xfrm>
           <a:prstGeom prst="rect">
             <a:avLst/>
@@ -7459,39 +7562,18 @@
           </a:bodyPr>
           <a:p>
             <a:r>
-              <a:rPr lang="en-US"/>
-              <a:t>Requires files to remain under a certain number of lines</a:t>
-            </a:r>
-            <a:endParaRPr lang="en-US"/>
-          </a:p>
-        </p:txBody>
-      </p:sp>
-      <p:sp>
-        <p:nvSpPr>
-          <p:cNvPr id="5" name="Text Box 4"/>
-          <p:cNvSpPr txBox="1"/>
-          <p:nvPr/>
-        </p:nvSpPr>
-        <p:spPr>
-          <a:xfrm>
-            <a:off x="299085" y="2585085"/>
-            <a:ext cx="8463915" cy="829945"/>
-          </a:xfrm>
-          <a:prstGeom prst="rect">
-            <a:avLst/>
-          </a:prstGeom>
-          <a:noFill/>
-        </p:spPr>
-        <p:txBody>
-          <a:bodyPr wrap="square" rtlCol="0" anchor="t">
-            <a:spAutoFit/>
-          </a:bodyPr>
-          <a:p>
-            <a:r>
-              <a:rPr lang="en-US"/>
-              <a:t>Limiting the number of lines allowed in a file allows files to remain small, single purpose, and maintainable.</a:t>
-            </a:r>
-            <a:endParaRPr lang="en-US"/>
+              <a:rPr lang="es-ES" altLang="en-US">
+                <a:solidFill>
+                  <a:schemeClr val="bg1"/>
+                </a:solidFill>
+              </a:rPr>
+              <a:t>These rules catch common errors in JS programming or otherwise confusing constructs that are prone to producing bugs:</a:t>
+            </a:r>
+            <a:endParaRPr lang="es-ES" altLang="en-US">
+              <a:solidFill>
+                <a:schemeClr val="bg1"/>
+              </a:solidFill>
+            </a:endParaRPr>
           </a:p>
         </p:txBody>
       </p:sp>
@@ -7553,7 +7635,7 @@
           <a:p>
             <a:r>
               <a:rPr lang="en-US"/>
-              <a:t>Rule: member-ordering</a:t>
+              <a:t>Rule: curly</a:t>
             </a:r>
             <a:endParaRPr lang="en-US"/>
           </a:p>
@@ -7567,8 +7649,8 @@
         </p:nvSpPr>
         <p:spPr>
           <a:xfrm>
-            <a:off x="299085" y="1543685"/>
-            <a:ext cx="5852795" cy="460375"/>
+            <a:off x="2480310" y="2524760"/>
+            <a:ext cx="2540000" cy="1198880"/>
           </a:xfrm>
           <a:prstGeom prst="rect">
             <a:avLst/>
@@ -7582,22 +7664,36 @@
           <a:p>
             <a:r>
               <a:rPr lang="en-US"/>
-              <a:t>Enforces member ordering.</a:t>
+              <a:t>if (foo === bar)</a:t>
             </a:r>
             <a:endParaRPr lang="en-US"/>
           </a:p>
-        </p:txBody>
-      </p:sp>
-      <p:sp>
-        <p:nvSpPr>
-          <p:cNvPr id="5" name="Text Box 4"/>
+          <a:p>
+            <a:r>
+              <a:rPr lang="en-US"/>
+              <a:t>    foo++;</a:t>
+            </a:r>
+            <a:endParaRPr lang="en-US"/>
+          </a:p>
+          <a:p>
+            <a:r>
+              <a:rPr lang="en-US"/>
+              <a:t>    bar++;</a:t>
+            </a:r>
+            <a:endParaRPr lang="en-US"/>
+          </a:p>
+        </p:txBody>
+      </p:sp>
+      <p:sp>
+        <p:nvSpPr>
+          <p:cNvPr id="6" name="Text Box 5"/>
           <p:cNvSpPr txBox="1"/>
           <p:nvPr/>
         </p:nvSpPr>
         <p:spPr>
           <a:xfrm>
-            <a:off x="299085" y="3994150"/>
-            <a:ext cx="11784965" cy="1938020"/>
+            <a:off x="534670" y="1636395"/>
+            <a:ext cx="7231380" cy="460375"/>
           </a:xfrm>
           <a:prstGeom prst="rect">
             <a:avLst/>
@@ -7610,71 +7706,46 @@
           </a:bodyPr>
           <a:p>
             <a:r>
+              <a:rPr lang="es-ES" altLang="en-US"/>
+              <a:t>En</a:t>
+            </a:r>
+            <a:r>
               <a:rPr lang="en-US"/>
-              <a:t>A consistent ordering for class members can make classes easier to read, navigate, and edit.</a:t>
+              <a:t>forces braces for if/for/do/while statements</a:t>
             </a:r>
             <a:endParaRPr lang="en-US"/>
           </a:p>
-          <a:p>
+        </p:txBody>
+      </p:sp>
+      <p:sp>
+        <p:nvSpPr>
+          <p:cNvPr id="7" name="Text Box 6"/>
+          <p:cNvSpPr txBox="1"/>
+          <p:nvPr/>
+        </p:nvSpPr>
+        <p:spPr>
+          <a:xfrm>
+            <a:off x="622935" y="4232275"/>
+            <a:ext cx="11252200" cy="1198880"/>
+          </a:xfrm>
+          <a:prstGeom prst="rect">
+            <a:avLst/>
+          </a:prstGeom>
+          <a:noFill/>
+        </p:spPr>
+        <p:txBody>
+          <a:bodyPr wrap="square" rtlCol="0" anchor="t">
+            <a:spAutoFit/>
+          </a:bodyPr>
+          <a:p>
+            <a:r>
+              <a:rPr lang="en-US"/>
+              <a:t>In the code above, the author almost certainly meant for both foo++ and bar++ to be executed only if foo === bar. However, they forgot braces and bar++ will be executed no matter what. This rule could prevent such a mistake.</a:t>
+            </a:r>
             <a:endParaRPr lang="en-US"/>
           </a:p>
-          <a:p>
-            <a:r>
-              <a:rPr lang="en-US"/>
-              <a:t>A common opposite practice to member-ordering is to keep related groups of classes together. Instead of creating classes with multiple separate groups, consider splitting class responsibilities apart across multiple single-responsibility classes.</a:t>
-            </a:r>
-            <a:endParaRPr lang="en-US"/>
-          </a:p>
-        </p:txBody>
-      </p:sp>
-      <p:pic>
-        <p:nvPicPr>
-          <p:cNvPr id="6" name="Picture 5"/>
-          <p:cNvPicPr>
-            <a:picLocks noChangeAspect="1"/>
-          </p:cNvPicPr>
-          <p:nvPr/>
-        </p:nvPicPr>
-        <p:blipFill>
-          <a:blip r:embed="rId1"/>
-          <a:stretch>
-            <a:fillRect/>
-          </a:stretch>
-        </p:blipFill>
-        <p:spPr>
-          <a:xfrm>
-            <a:off x="1546860" y="2185670"/>
-            <a:ext cx="3733165" cy="1583055"/>
-          </a:xfrm>
-          <a:prstGeom prst="rect">
-            <a:avLst/>
-          </a:prstGeom>
-        </p:spPr>
-      </p:pic>
-      <p:pic>
-        <p:nvPicPr>
-          <p:cNvPr id="7" name="Picture 6"/>
-          <p:cNvPicPr>
-            <a:picLocks noChangeAspect="1"/>
-          </p:cNvPicPr>
-          <p:nvPr/>
-        </p:nvPicPr>
-        <p:blipFill>
-          <a:blip r:embed="rId2"/>
-          <a:stretch>
-            <a:fillRect/>
-          </a:stretch>
-        </p:blipFill>
-        <p:spPr>
-          <a:xfrm>
-            <a:off x="6982460" y="1543685"/>
-            <a:ext cx="2940050" cy="2225040"/>
-          </a:xfrm>
-          <a:prstGeom prst="rect">
-            <a:avLst/>
-          </a:prstGeom>
-        </p:spPr>
-      </p:pic>
+        </p:txBody>
+      </p:sp>
     </p:spTree>
   </p:cSld>
   <p:clrMapOvr>
@@ -7695,7 +7766,7 @@
       <p:grpSpPr/>
       <p:sp>
         <p:nvSpPr>
-          <p:cNvPr id="2" name="Título 1"/>
+          <p:cNvPr id="2" name="Title 1"/>
           <p:cNvSpPr>
             <a:spLocks noGrp="1"/>
           </p:cNvSpPr>
@@ -7703,17 +7774,28 @@
             <p:ph type="title"/>
           </p:nvPr>
         </p:nvSpPr>
-        <p:spPr/>
+        <p:spPr>
+          <a:xfrm>
+            <a:off x="299401" y="85261"/>
+            <a:ext cx="8051577" cy="659096"/>
+          </a:xfrm>
+        </p:spPr>
         <p:txBody>
           <a:bodyPr/>
           <a:p>
-            <a:endParaRPr lang="es-ES" altLang="en-US"/>
-          </a:p>
-        </p:txBody>
-      </p:sp>
-      <p:sp>
-        <p:nvSpPr>
-          <p:cNvPr id="3" name="Marcador de posición de texto 2"/>
+            <a:r>
+              <a:rPr lang="es-ES" altLang="en-US">
+                <a:sym typeface="+mn-ea"/>
+              </a:rPr>
+              <a:t>TsLint</a:t>
+            </a:r>
+            <a:endParaRPr lang="en-US"/>
+          </a:p>
+        </p:txBody>
+      </p:sp>
+      <p:sp>
+        <p:nvSpPr>
+          <p:cNvPr id="3" name="Text Placeholder 2"/>
           <p:cNvSpPr>
             <a:spLocks noGrp="1"/>
           </p:cNvSpPr>
@@ -7721,24 +7803,33 @@
             <p:ph type="body" sz="quarter" idx="13"/>
           </p:nvPr>
         </p:nvSpPr>
-        <p:spPr/>
+        <p:spPr>
+          <a:xfrm>
+            <a:off x="299400" y="744522"/>
+            <a:ext cx="6228401" cy="513014"/>
+          </a:xfrm>
+        </p:spPr>
         <p:txBody>
           <a:bodyPr/>
           <a:p>
-            <a:endParaRPr lang="es-ES" altLang="en-US"/>
-          </a:p>
-        </p:txBody>
-      </p:sp>
-      <p:sp>
-        <p:nvSpPr>
-          <p:cNvPr id="5" name="Cuadro de texto 4"/>
+            <a:r>
+              <a:rPr lang="en-US"/>
+              <a:t>Rule: import-blacklist</a:t>
+            </a:r>
+            <a:endParaRPr lang="en-US"/>
+          </a:p>
+        </p:txBody>
+      </p:sp>
+      <p:sp>
+        <p:nvSpPr>
+          <p:cNvPr id="4" name="Text Box 3"/>
           <p:cNvSpPr txBox="1"/>
           <p:nvPr/>
         </p:nvSpPr>
         <p:spPr>
           <a:xfrm>
-            <a:off x="831215" y="2120900"/>
-            <a:ext cx="10088880" cy="460375"/>
+            <a:off x="299085" y="1866265"/>
+            <a:ext cx="6622415" cy="1198880"/>
           </a:xfrm>
           <a:prstGeom prst="rect">
             <a:avLst/>
@@ -7746,15 +7837,44 @@
           <a:noFill/>
         </p:spPr>
         <p:txBody>
-          <a:bodyPr wrap="square" rtlCol="0">
+          <a:bodyPr wrap="square" rtlCol="0" anchor="t">
             <a:spAutoFit/>
           </a:bodyPr>
           <a:p>
             <a:r>
-              <a:rPr lang="es-ES" altLang="en-US"/>
-              <a:t>Ejercicio Tslint</a:t>
-            </a:r>
-            <a:endParaRPr lang="es-ES" altLang="en-US"/>
+              <a:rPr lang="en-US"/>
+              <a:t>Disallows importing the specified modules directly via import and require. Instead only sub modules may be imported from that module.</a:t>
+            </a:r>
+            <a:endParaRPr lang="en-US"/>
+          </a:p>
+        </p:txBody>
+      </p:sp>
+      <p:sp>
+        <p:nvSpPr>
+          <p:cNvPr id="5" name="Text Box 4"/>
+          <p:cNvSpPr txBox="1"/>
+          <p:nvPr/>
+        </p:nvSpPr>
+        <p:spPr>
+          <a:xfrm>
+            <a:off x="299085" y="3305175"/>
+            <a:ext cx="6089015" cy="1568450"/>
+          </a:xfrm>
+          <a:prstGeom prst="rect">
+            <a:avLst/>
+          </a:prstGeom>
+          <a:noFill/>
+        </p:spPr>
+        <p:txBody>
+          <a:bodyPr wrap="square" rtlCol="0" anchor="t">
+            <a:spAutoFit/>
+          </a:bodyPr>
+          <a:p>
+            <a:r>
+              <a:rPr lang="en-US"/>
+              <a:t>Some libraries allow importing their submodules instead of the entire module. This is good practise as it avoids loading unused modules.</a:t>
+            </a:r>
+            <a:endParaRPr lang="en-US"/>
           </a:p>
         </p:txBody>
       </p:sp>
@@ -7767,26 +7887,25 @@
 </file>
 
 <file path=ppt/slides/slide18.xml><?xml version="1.0" encoding="utf-8"?>
-<p:sld xmlns:a="http://schemas.openxmlformats.org/drawingml/2006/main" xmlns:r="http://schemas.openxmlformats.org/officeDocument/2006/relationships" xmlns:p="http://schemas.openxmlformats.org/presentationml/2006/main" showMasterSp="0">
+<p:sld xmlns:a="http://schemas.openxmlformats.org/drawingml/2006/main" xmlns:r="http://schemas.openxmlformats.org/officeDocument/2006/relationships" xmlns:p="http://schemas.openxmlformats.org/presentationml/2006/main">
   <p:cSld>
-    <p:bg>
-      <p:bgPr>
-        <a:solidFill>
-          <a:srgbClr val="173962"/>
-        </a:solidFill>
-        <a:effectLst/>
-      </p:bgPr>
-    </p:bg>
     <p:spTree>
       <p:nvGrpSpPr>
         <p:cNvPr id="1" name=""/>
         <p:cNvGrpSpPr/>
         <p:nvPr/>
       </p:nvGrpSpPr>
-      <p:grpSpPr/>
-      <p:sp>
-        <p:nvSpPr>
-          <p:cNvPr id="2" name="Title 1"/>
+      <p:grpSpPr>
+        <a:xfrm>
+          <a:off x="0" y="0"/>
+          <a:ext cx="0" cy="0"/>
+          <a:chOff x="0" y="0"/>
+          <a:chExt cx="0" cy="0"/>
+        </a:xfrm>
+      </p:grpSpPr>
+      <p:sp>
+        <p:nvSpPr>
+          <p:cNvPr id="2" name="Título 1"/>
           <p:cNvSpPr>
             <a:spLocks noGrp="1"/>
           </p:cNvSpPr>
@@ -7796,78 +7915,37 @@
         </p:nvSpPr>
         <p:spPr>
           <a:xfrm>
-            <a:off x="1487488" y="523903"/>
-            <a:ext cx="7584744" cy="859035"/>
+            <a:off x="5260340" y="2482850"/>
+            <a:ext cx="1671955" cy="859155"/>
           </a:xfrm>
         </p:spPr>
         <p:txBody>
           <a:bodyPr>
             <a:normAutofit fontScale="90000"/>
           </a:bodyPr>
-          <a:p>
-            <a:r>
-              <a:rPr lang="es-ES" altLang="en-US"/>
-              <a:t>Codelyzer</a:t>
+          <a:lstStyle/>
+          <a:p>
+            <a:r>
+              <a:rPr lang="es-ES" dirty="0"/>
+              <a:t>Style</a:t>
             </a:r>
             <a:br>
-              <a:rPr lang="es-ES" altLang="en-US"/>
+              <a:rPr lang="es-ES" dirty="0"/>
             </a:br>
-            <a:endParaRPr lang="es-ES" altLang="en-US"/>
-          </a:p>
-        </p:txBody>
-      </p:sp>
-      <p:sp>
-        <p:nvSpPr>
-          <p:cNvPr id="3" name="Text Box 2"/>
+            <a:endParaRPr lang="es-ES" dirty="0"/>
+          </a:p>
+        </p:txBody>
+      </p:sp>
+      <p:sp>
+        <p:nvSpPr>
+          <p:cNvPr id="3" name="Cuadro de texto 2"/>
           <p:cNvSpPr txBox="1"/>
           <p:nvPr/>
         </p:nvSpPr>
         <p:spPr>
           <a:xfrm>
-            <a:off x="1238250" y="4765040"/>
-            <a:ext cx="7585075" cy="829945"/>
-          </a:xfrm>
-          <a:prstGeom prst="rect">
-            <a:avLst/>
-          </a:prstGeom>
-          <a:noFill/>
-        </p:spPr>
-        <p:txBody>
-          <a:bodyPr wrap="square" rtlCol="0" anchor="t">
-            <a:spAutoFit/>
-          </a:bodyPr>
-          <a:p>
-            <a:pPr marL="457200" indent="-457200">
-              <a:buAutoNum type="arabicPeriod"/>
-            </a:pPr>
-            <a:endParaRPr lang="en-US">
-              <a:solidFill>
-                <a:schemeClr val="bg1"/>
-              </a:solidFill>
-            </a:endParaRPr>
-          </a:p>
-          <a:p>
-            <a:pPr marL="457200" indent="-457200">
-              <a:buAutoNum type="arabicPeriod"/>
-            </a:pPr>
-            <a:endParaRPr lang="en-US">
-              <a:solidFill>
-                <a:schemeClr val="bg1"/>
-              </a:solidFill>
-            </a:endParaRPr>
-          </a:p>
-        </p:txBody>
-      </p:sp>
-      <p:sp>
-        <p:nvSpPr>
-          <p:cNvPr id="9" name="Cuadro de texto 8"/>
-          <p:cNvSpPr txBox="1"/>
-          <p:nvPr/>
-        </p:nvSpPr>
-        <p:spPr>
-          <a:xfrm>
-            <a:off x="505460" y="4672965"/>
-            <a:ext cx="11226800" cy="460375"/>
+            <a:off x="1753235" y="5317490"/>
+            <a:ext cx="9058275" cy="460375"/>
           </a:xfrm>
           <a:prstGeom prst="rect">
             <a:avLst/>
@@ -7885,7 +7963,7 @@
                   <a:schemeClr val="bg1"/>
                 </a:solidFill>
               </a:rPr>
-              <a:t>A set of tslint rules for static code analysis of Angular TypeScript projects.</a:t>
+              <a:t>These rules enforce consistent style across your codebase:</a:t>
             </a:r>
             <a:endParaRPr lang="es-ES" altLang="en-US">
               <a:solidFill>
@@ -7895,30 +7973,6 @@
           </a:p>
         </p:txBody>
       </p:sp>
-      <p:pic>
-        <p:nvPicPr>
-          <p:cNvPr id="7" name="Imagen 6" descr="codelyzer_logo_sinfondo"/>
-          <p:cNvPicPr>
-            <a:picLocks noChangeAspect="1"/>
-          </p:cNvPicPr>
-          <p:nvPr/>
-        </p:nvPicPr>
-        <p:blipFill>
-          <a:blip r:embed="rId1"/>
-          <a:stretch>
-            <a:fillRect/>
-          </a:stretch>
-        </p:blipFill>
-        <p:spPr>
-          <a:xfrm>
-            <a:off x="4351020" y="1383030"/>
-            <a:ext cx="2667000" cy="2857500"/>
-          </a:xfrm>
-          <a:prstGeom prst="rect">
-            <a:avLst/>
-          </a:prstGeom>
-        </p:spPr>
-      </p:pic>
     </p:spTree>
   </p:cSld>
   <p:clrMapOvr>
@@ -7952,10 +8006,12 @@
           <a:bodyPr/>
           <a:p>
             <a:r>
-              <a:rPr lang="es-ES" altLang="en-US"/>
-              <a:t>Codelyzer</a:t>
-            </a:r>
-            <a:endParaRPr lang="es-ES" altLang="en-US"/>
+              <a:rPr lang="es-ES" altLang="en-US">
+                <a:sym typeface="+mn-ea"/>
+              </a:rPr>
+              <a:t>TsLint</a:t>
+            </a:r>
+            <a:endParaRPr lang="en-US"/>
           </a:p>
         </p:txBody>
       </p:sp>
@@ -7974,23 +8030,23 @@
           <a:bodyPr/>
           <a:p>
             <a:r>
-              <a:rPr lang="es-ES" altLang="en-US"/>
-              <a:t>What is</a:t>
-            </a:r>
-            <a:endParaRPr lang="es-ES" altLang="en-US"/>
-          </a:p>
-        </p:txBody>
-      </p:sp>
-      <p:sp>
-        <p:nvSpPr>
-          <p:cNvPr id="5" name="Cuadro de texto 4"/>
+              <a:rPr lang="en-US"/>
+              <a:t>Rule: comment-format</a:t>
+            </a:r>
+            <a:endParaRPr lang="en-US"/>
+          </a:p>
+        </p:txBody>
+      </p:sp>
+      <p:sp>
+        <p:nvSpPr>
+          <p:cNvPr id="4" name="Text Box 3"/>
           <p:cNvSpPr txBox="1"/>
           <p:nvPr/>
         </p:nvSpPr>
         <p:spPr>
           <a:xfrm>
-            <a:off x="328295" y="5113020"/>
-            <a:ext cx="4116705" cy="829945"/>
+            <a:off x="299085" y="1563370"/>
+            <a:ext cx="7071360" cy="460375"/>
           </a:xfrm>
           <a:prstGeom prst="rect">
             <a:avLst/>
@@ -8003,44 +8059,42 @@
           </a:bodyPr>
           <a:p>
             <a:r>
-              <a:rPr lang="es-ES" altLang="en-US"/>
-              <a:t>Rules:</a:t>
-            </a:r>
-            <a:endParaRPr lang="es-ES" altLang="en-US"/>
-          </a:p>
-          <a:p>
-            <a:r>
-              <a:rPr lang="es-ES" altLang="en-US"/>
-              <a:t>http://codelyzer.com/rules/</a:t>
-            </a:r>
-            <a:endParaRPr lang="es-ES" altLang="en-US"/>
-          </a:p>
-        </p:txBody>
-      </p:sp>
-      <p:pic>
-        <p:nvPicPr>
-          <p:cNvPr id="6" name="Imagen 5" descr="DeElvCJUQAA-FN1"/>
-          <p:cNvPicPr>
-            <a:picLocks noChangeAspect="1"/>
-          </p:cNvPicPr>
+              <a:rPr lang="en-US"/>
+              <a:t>Enforces formatting rules for single-line comments.</a:t>
+            </a:r>
+            <a:endParaRPr lang="en-US"/>
+          </a:p>
+        </p:txBody>
+      </p:sp>
+      <p:sp>
+        <p:nvSpPr>
+          <p:cNvPr id="5" name="Text Box 4"/>
+          <p:cNvSpPr txBox="1"/>
           <p:nvPr/>
-        </p:nvPicPr>
-        <p:blipFill>
-          <a:blip r:embed="rId1"/>
-          <a:stretch>
-            <a:fillRect/>
-          </a:stretch>
-        </p:blipFill>
-        <p:spPr>
-          <a:xfrm>
-            <a:off x="4445000" y="879475"/>
-            <a:ext cx="6600190" cy="4233545"/>
-          </a:xfrm>
-          <a:prstGeom prst="rect">
-            <a:avLst/>
-          </a:prstGeom>
-        </p:spPr>
-      </p:pic>
+        </p:nvSpPr>
+        <p:spPr>
+          <a:xfrm>
+            <a:off x="299085" y="2585085"/>
+            <a:ext cx="8463915" cy="460375"/>
+          </a:xfrm>
+          <a:prstGeom prst="rect">
+            <a:avLst/>
+          </a:prstGeom>
+          <a:noFill/>
+        </p:spPr>
+        <p:txBody>
+          <a:bodyPr wrap="square" rtlCol="0" anchor="t">
+            <a:spAutoFit/>
+          </a:bodyPr>
+          <a:p>
+            <a:r>
+              <a:rPr lang="en-US"/>
+              <a:t>Helps maintain a consistent, readable style in your codebase.</a:t>
+            </a:r>
+            <a:endParaRPr lang="en-US"/>
+          </a:p>
+        </p:txBody>
+      </p:sp>
     </p:spTree>
   </p:cSld>
   <p:clrMapOvr>
@@ -8268,7 +8322,7 @@
       <p:grpSpPr/>
       <p:sp>
         <p:nvSpPr>
-          <p:cNvPr id="2" name="Title 1"/>
+          <p:cNvPr id="2" name="Título 1"/>
           <p:cNvSpPr>
             <a:spLocks noGrp="1"/>
           </p:cNvSpPr>
@@ -8280,19 +8334,13 @@
         <p:txBody>
           <a:bodyPr/>
           <a:p>
-            <a:r>
-              <a:rPr lang="es-ES" altLang="en-US">
-                <a:sym typeface="+mn-ea"/>
-              </a:rPr>
-              <a:t>Codelyzer</a:t>
-            </a:r>
-            <a:endParaRPr lang="en-US"/>
-          </a:p>
-        </p:txBody>
-      </p:sp>
-      <p:sp>
-        <p:nvSpPr>
-          <p:cNvPr id="3" name="Text Placeholder 2"/>
+            <a:endParaRPr lang="es-ES" altLang="en-US"/>
+          </a:p>
+        </p:txBody>
+      </p:sp>
+      <p:sp>
+        <p:nvSpPr>
+          <p:cNvPr id="3" name="Marcador de posición de texto 2"/>
           <p:cNvSpPr>
             <a:spLocks noGrp="1"/>
           </p:cNvSpPr>
@@ -8304,9 +8352,34 @@
         <p:txBody>
           <a:bodyPr/>
           <a:p>
+            <a:endParaRPr lang="es-ES" altLang="en-US"/>
+          </a:p>
+        </p:txBody>
+      </p:sp>
+      <p:sp>
+        <p:nvSpPr>
+          <p:cNvPr id="5" name="Cuadro de texto 4"/>
+          <p:cNvSpPr txBox="1"/>
+          <p:nvPr/>
+        </p:nvSpPr>
+        <p:spPr>
+          <a:xfrm>
+            <a:off x="831215" y="2120900"/>
+            <a:ext cx="10088880" cy="460375"/>
+          </a:xfrm>
+          <a:prstGeom prst="rect">
+            <a:avLst/>
+          </a:prstGeom>
+          <a:noFill/>
+        </p:spPr>
+        <p:txBody>
+          <a:bodyPr wrap="square" rtlCol="0">
+            <a:spAutoFit/>
+          </a:bodyPr>
+          <a:p>
             <a:r>
               <a:rPr lang="es-ES" altLang="en-US"/>
-              <a:t>Rule 1</a:t>
+              <a:t>Ejercicio Tslint</a:t>
             </a:r>
             <a:endParaRPr lang="es-ES" altLang="en-US"/>
           </a:p>
@@ -8345,15 +8418,10 @@
           <a:bodyPr/>
           <a:p>
             <a:r>
-              <a:rPr lang="es-ES" altLang="en-US">
-                <a:sym typeface="+mn-ea"/>
-              </a:rPr>
+              <a:rPr lang="es-ES" altLang="en-US"/>
               <a:t>Codelyzer</a:t>
             </a:r>
-            <a:br>
-              <a:rPr lang="es-ES" altLang="en-US"/>
-            </a:br>
-            <a:endParaRPr lang="en-US"/>
+            <a:endParaRPr lang="es-ES" altLang="en-US"/>
           </a:p>
         </p:txBody>
       </p:sp>
@@ -8373,12 +8441,135 @@
           <a:p>
             <a:r>
               <a:rPr lang="es-ES" altLang="en-US"/>
-              <a:t>Rule 2</a:t>
+              <a:t>What is</a:t>
             </a:r>
             <a:endParaRPr lang="es-ES" altLang="en-US"/>
           </a:p>
         </p:txBody>
       </p:sp>
+      <p:sp>
+        <p:nvSpPr>
+          <p:cNvPr id="5" name="Cuadro de texto 4"/>
+          <p:cNvSpPr txBox="1"/>
+          <p:nvPr/>
+        </p:nvSpPr>
+        <p:spPr>
+          <a:xfrm>
+            <a:off x="5892165" y="5431790"/>
+            <a:ext cx="4116705" cy="829945"/>
+          </a:xfrm>
+          <a:prstGeom prst="rect">
+            <a:avLst/>
+          </a:prstGeom>
+          <a:noFill/>
+        </p:spPr>
+        <p:txBody>
+          <a:bodyPr wrap="square" rtlCol="0" anchor="t">
+            <a:spAutoFit/>
+          </a:bodyPr>
+          <a:p>
+            <a:r>
+              <a:rPr lang="es-ES" altLang="en-US"/>
+              <a:t>Rules:</a:t>
+            </a:r>
+            <a:endParaRPr lang="es-ES" altLang="en-US"/>
+          </a:p>
+          <a:p>
+            <a:r>
+              <a:rPr lang="es-ES" altLang="en-US"/>
+              <a:t>http://codelyzer.com/rules/</a:t>
+            </a:r>
+            <a:endParaRPr lang="es-ES" altLang="en-US"/>
+          </a:p>
+        </p:txBody>
+      </p:sp>
+      <p:pic>
+        <p:nvPicPr>
+          <p:cNvPr id="6" name="Imagen 5" descr="DeElvCJUQAA-FN1"/>
+          <p:cNvPicPr>
+            <a:picLocks noChangeAspect="1"/>
+          </p:cNvPicPr>
+          <p:nvPr/>
+        </p:nvPicPr>
+        <p:blipFill>
+          <a:blip r:embed="rId1"/>
+          <a:stretch>
+            <a:fillRect/>
+          </a:stretch>
+        </p:blipFill>
+        <p:spPr>
+          <a:xfrm>
+            <a:off x="5182870" y="1198245"/>
+            <a:ext cx="6600190" cy="4233545"/>
+          </a:xfrm>
+          <a:prstGeom prst="rect">
+            <a:avLst/>
+          </a:prstGeom>
+        </p:spPr>
+      </p:pic>
+      <p:sp>
+        <p:nvSpPr>
+          <p:cNvPr id="4" name="Cuadro de texto 3"/>
+          <p:cNvSpPr txBox="1"/>
+          <p:nvPr/>
+        </p:nvSpPr>
+        <p:spPr>
+          <a:xfrm>
+            <a:off x="541020" y="4641215"/>
+            <a:ext cx="4525010" cy="1198880"/>
+          </a:xfrm>
+          <a:prstGeom prst="rect">
+            <a:avLst/>
+          </a:prstGeom>
+          <a:noFill/>
+        </p:spPr>
+        <p:txBody>
+          <a:bodyPr wrap="square" rtlCol="0" anchor="t">
+            <a:spAutoFit/>
+          </a:bodyPr>
+          <a:p>
+            <a:r>
+              <a:rPr lang="es-ES" altLang="en-US">
+                <a:solidFill>
+                  <a:schemeClr val="tx1"/>
+                </a:solidFill>
+                <a:sym typeface="+mn-ea"/>
+              </a:rPr>
+              <a:t>A set of tslint rules for static code analysis of Angular TypeScript projects.</a:t>
+            </a:r>
+            <a:endParaRPr lang="es-ES" altLang="en-US">
+              <a:solidFill>
+                <a:schemeClr val="tx1"/>
+              </a:solidFill>
+              <a:sym typeface="+mn-ea"/>
+            </a:endParaRPr>
+          </a:p>
+        </p:txBody>
+      </p:sp>
+      <p:pic>
+        <p:nvPicPr>
+          <p:cNvPr id="7" name="Imagen 6" descr="codelyzer_logo_sinfondo"/>
+          <p:cNvPicPr>
+            <a:picLocks noChangeAspect="1"/>
+          </p:cNvPicPr>
+          <p:nvPr/>
+        </p:nvPicPr>
+        <p:blipFill>
+          <a:blip r:embed="rId2"/>
+          <a:stretch>
+            <a:fillRect/>
+          </a:stretch>
+        </p:blipFill>
+        <p:spPr>
+          <a:xfrm>
+            <a:off x="1668145" y="1552575"/>
+            <a:ext cx="2270760" cy="2432685"/>
+          </a:xfrm>
+          <a:prstGeom prst="rect">
+            <a:avLst/>
+          </a:prstGeom>
+        </p:spPr>
+      </p:pic>
     </p:spTree>
   </p:cSld>
   <p:clrMapOvr>
@@ -8431,13 +8622,76 @@
             <p:ph type="body" sz="quarter" idx="13"/>
           </p:nvPr>
         </p:nvSpPr>
-        <p:spPr/>
+        <p:spPr>
+          <a:xfrm>
+            <a:off x="299400" y="767382"/>
+            <a:ext cx="6228401" cy="513014"/>
+          </a:xfrm>
+        </p:spPr>
         <p:txBody>
           <a:bodyPr/>
           <a:p>
             <a:r>
               <a:rPr lang="es-ES" altLang="en-US"/>
-              <a:t>Rule 3</a:t>
+              <a:t>Rule: trackBy-function</a:t>
+            </a:r>
+            <a:endParaRPr lang="es-ES" altLang="en-US"/>
+          </a:p>
+        </p:txBody>
+      </p:sp>
+      <p:sp>
+        <p:nvSpPr>
+          <p:cNvPr id="4" name="Cuadro de texto 3"/>
+          <p:cNvSpPr txBox="1"/>
+          <p:nvPr/>
+        </p:nvSpPr>
+        <p:spPr>
+          <a:xfrm>
+            <a:off x="299085" y="1778635"/>
+            <a:ext cx="4815205" cy="460375"/>
+          </a:xfrm>
+          <a:prstGeom prst="rect">
+            <a:avLst/>
+          </a:prstGeom>
+          <a:noFill/>
+        </p:spPr>
+        <p:txBody>
+          <a:bodyPr wrap="square" rtlCol="0" anchor="t">
+            <a:spAutoFit/>
+          </a:bodyPr>
+          <a:p>
+            <a:r>
+              <a:rPr lang="es-ES" altLang="en-US"/>
+              <a:t>Ensures a TrackBy function is used.</a:t>
+            </a:r>
+            <a:endParaRPr lang="es-ES" altLang="en-US"/>
+          </a:p>
+        </p:txBody>
+      </p:sp>
+      <p:sp>
+        <p:nvSpPr>
+          <p:cNvPr id="5" name="Cuadro de texto 4"/>
+          <p:cNvSpPr txBox="1"/>
+          <p:nvPr/>
+        </p:nvSpPr>
+        <p:spPr>
+          <a:xfrm>
+            <a:off x="299085" y="2689860"/>
+            <a:ext cx="6503035" cy="460375"/>
+          </a:xfrm>
+          <a:prstGeom prst="rect">
+            <a:avLst/>
+          </a:prstGeom>
+          <a:noFill/>
+        </p:spPr>
+        <p:txBody>
+          <a:bodyPr wrap="square" rtlCol="0" anchor="t">
+            <a:spAutoFit/>
+          </a:bodyPr>
+          <a:p>
+            <a:r>
+              <a:rPr lang="es-ES" altLang="en-US"/>
+              <a:t>Using TrackBy is considired as a best pratice.</a:t>
             </a:r>
             <a:endParaRPr lang="es-ES" altLang="en-US"/>
           </a:p>
@@ -8463,7 +8717,7 @@
       <p:grpSpPr/>
       <p:sp>
         <p:nvSpPr>
-          <p:cNvPr id="2" name="Título 1"/>
+          <p:cNvPr id="2" name="Title 1"/>
           <p:cNvSpPr>
             <a:spLocks noGrp="1"/>
           </p:cNvSpPr>
@@ -8475,13 +8729,22 @@
         <p:txBody>
           <a:bodyPr/>
           <a:p>
-            <a:endParaRPr lang="es-ES" altLang="en-US"/>
-          </a:p>
-        </p:txBody>
-      </p:sp>
-      <p:sp>
-        <p:nvSpPr>
-          <p:cNvPr id="3" name="Marcador de posición de texto 2"/>
+            <a:r>
+              <a:rPr lang="es-ES" altLang="en-US">
+                <a:sym typeface="+mn-ea"/>
+              </a:rPr>
+              <a:t>Codelyzer</a:t>
+            </a:r>
+            <a:br>
+              <a:rPr lang="es-ES" altLang="en-US"/>
+            </a:br>
+            <a:endParaRPr lang="en-US"/>
+          </a:p>
+        </p:txBody>
+      </p:sp>
+      <p:sp>
+        <p:nvSpPr>
+          <p:cNvPr id="3" name="Text Placeholder 2"/>
           <p:cNvSpPr>
             <a:spLocks noGrp="1"/>
           </p:cNvSpPr>
@@ -8493,6 +8756,39 @@
         <p:txBody>
           <a:bodyPr/>
           <a:p>
+            <a:r>
+              <a:rPr lang="es-ES" altLang="en-US"/>
+              <a:t>Rule: component-selector</a:t>
+            </a:r>
+            <a:endParaRPr lang="es-ES" altLang="en-US"/>
+          </a:p>
+        </p:txBody>
+      </p:sp>
+      <p:sp>
+        <p:nvSpPr>
+          <p:cNvPr id="4" name="Cuadro de texto 3"/>
+          <p:cNvSpPr txBox="1"/>
+          <p:nvPr/>
+        </p:nvSpPr>
+        <p:spPr>
+          <a:xfrm>
+            <a:off x="619125" y="1478915"/>
+            <a:ext cx="7411720" cy="460375"/>
+          </a:xfrm>
+          <a:prstGeom prst="rect">
+            <a:avLst/>
+          </a:prstGeom>
+          <a:noFill/>
+        </p:spPr>
+        <p:txBody>
+          <a:bodyPr wrap="square" rtlCol="0" anchor="t">
+            <a:spAutoFit/>
+          </a:bodyPr>
+          <a:p>
+            <a:r>
+              <a:rPr lang="es-ES" altLang="en-US"/>
+              <a:t>Component selectors should follow given naming rules</a:t>
+            </a:r>
             <a:endParaRPr lang="es-ES" altLang="en-US"/>
           </a:p>
         </p:txBody>
@@ -8505,8 +8801,8 @@
         </p:nvSpPr>
         <p:spPr>
           <a:xfrm>
-            <a:off x="831215" y="2120900"/>
-            <a:ext cx="10088880" cy="460375"/>
+            <a:off x="619125" y="2537460"/>
+            <a:ext cx="7597775" cy="2306955"/>
           </a:xfrm>
           <a:prstGeom prst="rect">
             <a:avLst/>
@@ -8514,15 +8810,63 @@
           <a:noFill/>
         </p:spPr>
         <p:txBody>
-          <a:bodyPr wrap="square" rtlCol="0">
+          <a:bodyPr wrap="square" rtlCol="0" anchor="t">
             <a:spAutoFit/>
           </a:bodyPr>
           <a:p>
-            <a:r>
-              <a:rPr lang="es-ES" altLang="en-US"/>
-              <a:t>Ejercicio Codelyzer</a:t>
-            </a:r>
-            <a:endParaRPr lang="es-ES" altLang="en-US"/>
+            <a:pPr marL="285750" indent="-285750">
+              <a:buFont typeface="Arial" panose="020B0604020202020204" pitchFamily="34" charset="0"/>
+              <a:buChar char="•"/>
+            </a:pPr>
+            <a:r>
+              <a:rPr lang="es-ES" altLang="en-US" sz="1800"/>
+              <a:t>Consistent conventions make it easy to quickly identify and reference assets of different types.</a:t>
+            </a:r>
+            <a:endParaRPr lang="es-ES" altLang="en-US" sz="1800"/>
+          </a:p>
+          <a:p>
+            <a:pPr marL="285750" indent="-285750">
+              <a:buFont typeface="Arial" panose="020B0604020202020204" pitchFamily="34" charset="0"/>
+              <a:buChar char="•"/>
+            </a:pPr>
+            <a:r>
+              <a:rPr lang="es-ES" altLang="en-US" sz="1800"/>
+              <a:t>Makes it easier to promote and share the component in other apps.</a:t>
+            </a:r>
+            <a:endParaRPr lang="es-ES" altLang="en-US" sz="1800"/>
+          </a:p>
+          <a:p>
+            <a:pPr marL="285750" indent="-285750">
+              <a:buFont typeface="Arial" panose="020B0604020202020204" pitchFamily="34" charset="0"/>
+              <a:buChar char="•"/>
+            </a:pPr>
+            <a:r>
+              <a:rPr lang="es-ES" altLang="en-US" sz="1800"/>
+              <a:t>Components are easy to identify in the DOM.</a:t>
+            </a:r>
+            <a:endParaRPr lang="es-ES" altLang="en-US" sz="1800"/>
+          </a:p>
+          <a:p>
+            <a:pPr marL="285750" indent="-285750">
+              <a:buFont typeface="Arial" panose="020B0604020202020204" pitchFamily="34" charset="0"/>
+              <a:buChar char="•"/>
+            </a:pPr>
+            <a:r>
+              <a:rPr lang="es-ES" altLang="en-US" sz="1800"/>
+              <a:t>Keeps the element names consistent with the specification for Custom Elements.</a:t>
+            </a:r>
+            <a:endParaRPr lang="es-ES" altLang="en-US" sz="1800"/>
+          </a:p>
+          <a:p>
+            <a:pPr marL="285750" indent="-285750">
+              <a:buFont typeface="Arial" panose="020B0604020202020204" pitchFamily="34" charset="0"/>
+              <a:buChar char="•"/>
+            </a:pPr>
+            <a:r>
+              <a:rPr lang="es-ES" altLang="en-US" sz="1800"/>
+              <a:t>It is easier to recognize that a symbol is a component by looking at the template’s HTML.</a:t>
+            </a:r>
+            <a:endParaRPr lang="es-ES" altLang="en-US" sz="1800"/>
           </a:p>
         </p:txBody>
       </p:sp>
@@ -8546,7 +8890,7 @@
       <p:grpSpPr/>
       <p:sp>
         <p:nvSpPr>
-          <p:cNvPr id="2" name="Título 1"/>
+          <p:cNvPr id="2" name="Title 1"/>
           <p:cNvSpPr>
             <a:spLocks noGrp="1"/>
           </p:cNvSpPr>
@@ -8558,13 +8902,19 @@
         <p:txBody>
           <a:bodyPr/>
           <a:p>
-            <a:endParaRPr lang="es-ES" altLang="en-US"/>
-          </a:p>
-        </p:txBody>
-      </p:sp>
-      <p:sp>
-        <p:nvSpPr>
-          <p:cNvPr id="3" name="Marcador de posición de texto 2"/>
+            <a:r>
+              <a:rPr lang="es-ES" altLang="en-US">
+                <a:sym typeface="+mn-ea"/>
+              </a:rPr>
+              <a:t>Codelyzer</a:t>
+            </a:r>
+            <a:endParaRPr lang="en-US"/>
+          </a:p>
+        </p:txBody>
+      </p:sp>
+      <p:sp>
+        <p:nvSpPr>
+          <p:cNvPr id="3" name="Text Placeholder 2"/>
           <p:cNvSpPr>
             <a:spLocks noGrp="1"/>
           </p:cNvSpPr>
@@ -8576,6 +8926,39 @@
         <p:txBody>
           <a:bodyPr/>
           <a:p>
+            <a:r>
+              <a:rPr lang="es-ES" altLang="en-US"/>
+              <a:t>Rule: use-life-cycle-interface</a:t>
+            </a:r>
+            <a:endParaRPr lang="es-ES" altLang="en-US"/>
+          </a:p>
+        </p:txBody>
+      </p:sp>
+      <p:sp>
+        <p:nvSpPr>
+          <p:cNvPr id="4" name="Cuadro de texto 3"/>
+          <p:cNvSpPr txBox="1"/>
+          <p:nvPr/>
+        </p:nvSpPr>
+        <p:spPr>
+          <a:xfrm>
+            <a:off x="396875" y="1869440"/>
+            <a:ext cx="8507095" cy="829945"/>
+          </a:xfrm>
+          <a:prstGeom prst="rect">
+            <a:avLst/>
+          </a:prstGeom>
+          <a:noFill/>
+        </p:spPr>
+        <p:txBody>
+          <a:bodyPr wrap="square" rtlCol="0" anchor="t">
+            <a:spAutoFit/>
+          </a:bodyPr>
+          <a:p>
+            <a:r>
+              <a:rPr lang="es-ES" altLang="en-US"/>
+              <a:t>Ensure that components implement life cycle interfaces if they use them.</a:t>
+            </a:r>
             <a:endParaRPr lang="es-ES" altLang="en-US"/>
           </a:p>
         </p:txBody>
@@ -8588,8 +8971,8 @@
         </p:nvSpPr>
         <p:spPr>
           <a:xfrm>
-            <a:off x="831215" y="2120900"/>
-            <a:ext cx="10088880" cy="460375"/>
+            <a:off x="396875" y="3613150"/>
+            <a:ext cx="5398770" cy="829945"/>
           </a:xfrm>
           <a:prstGeom prst="rect">
             <a:avLst/>
@@ -8597,13 +8980,13 @@
           <a:noFill/>
         </p:spPr>
         <p:txBody>
-          <a:bodyPr wrap="square" rtlCol="0">
+          <a:bodyPr wrap="square" rtlCol="0" anchor="t">
             <a:spAutoFit/>
           </a:bodyPr>
           <a:p>
             <a:r>
               <a:rPr lang="es-ES" altLang="en-US"/>
-              <a:t>Workshop</a:t>
+              <a:t>Interfaces prescribe typed method signatures. </a:t>
             </a:r>
             <a:endParaRPr lang="es-ES" altLang="en-US"/>
           </a:p>
@@ -8618,6 +9001,172 @@
 </file>
 
 <file path=ppt/slides/slide25.xml><?xml version="1.0" encoding="utf-8"?>
+<p:sld xmlns:a="http://schemas.openxmlformats.org/drawingml/2006/main" xmlns:r="http://schemas.openxmlformats.org/officeDocument/2006/relationships" xmlns:p="http://schemas.openxmlformats.org/presentationml/2006/main">
+  <p:cSld>
+    <p:spTree>
+      <p:nvGrpSpPr>
+        <p:cNvPr id="1" name=""/>
+        <p:cNvGrpSpPr/>
+        <p:nvPr/>
+      </p:nvGrpSpPr>
+      <p:grpSpPr/>
+      <p:sp>
+        <p:nvSpPr>
+          <p:cNvPr id="2" name="Título 1"/>
+          <p:cNvSpPr>
+            <a:spLocks noGrp="1"/>
+          </p:cNvSpPr>
+          <p:nvPr>
+            <p:ph type="title"/>
+          </p:nvPr>
+        </p:nvSpPr>
+        <p:spPr/>
+        <p:txBody>
+          <a:bodyPr/>
+          <a:p>
+            <a:endParaRPr lang="es-ES" altLang="en-US"/>
+          </a:p>
+        </p:txBody>
+      </p:sp>
+      <p:sp>
+        <p:nvSpPr>
+          <p:cNvPr id="3" name="Marcador de posición de texto 2"/>
+          <p:cNvSpPr>
+            <a:spLocks noGrp="1"/>
+          </p:cNvSpPr>
+          <p:nvPr>
+            <p:ph type="body" sz="quarter" idx="13"/>
+          </p:nvPr>
+        </p:nvSpPr>
+        <p:spPr/>
+        <p:txBody>
+          <a:bodyPr/>
+          <a:p>
+            <a:endParaRPr lang="es-ES" altLang="en-US"/>
+          </a:p>
+        </p:txBody>
+      </p:sp>
+      <p:sp>
+        <p:nvSpPr>
+          <p:cNvPr id="5" name="Cuadro de texto 4"/>
+          <p:cNvSpPr txBox="1"/>
+          <p:nvPr/>
+        </p:nvSpPr>
+        <p:spPr>
+          <a:xfrm>
+            <a:off x="831215" y="2120900"/>
+            <a:ext cx="10088880" cy="460375"/>
+          </a:xfrm>
+          <a:prstGeom prst="rect">
+            <a:avLst/>
+          </a:prstGeom>
+          <a:noFill/>
+        </p:spPr>
+        <p:txBody>
+          <a:bodyPr wrap="square" rtlCol="0">
+            <a:spAutoFit/>
+          </a:bodyPr>
+          <a:p>
+            <a:r>
+              <a:rPr lang="es-ES" altLang="en-US"/>
+              <a:t>Ejercicio Codelyzer</a:t>
+            </a:r>
+            <a:endParaRPr lang="es-ES" altLang="en-US"/>
+          </a:p>
+        </p:txBody>
+      </p:sp>
+    </p:spTree>
+  </p:cSld>
+  <p:clrMapOvr>
+    <a:masterClrMapping/>
+  </p:clrMapOvr>
+</p:sld>
+</file>
+
+<file path=ppt/slides/slide26.xml><?xml version="1.0" encoding="utf-8"?>
+<p:sld xmlns:a="http://schemas.openxmlformats.org/drawingml/2006/main" xmlns:r="http://schemas.openxmlformats.org/officeDocument/2006/relationships" xmlns:p="http://schemas.openxmlformats.org/presentationml/2006/main">
+  <p:cSld>
+    <p:spTree>
+      <p:nvGrpSpPr>
+        <p:cNvPr id="1" name=""/>
+        <p:cNvGrpSpPr/>
+        <p:nvPr/>
+      </p:nvGrpSpPr>
+      <p:grpSpPr/>
+      <p:sp>
+        <p:nvSpPr>
+          <p:cNvPr id="2" name="Título 1"/>
+          <p:cNvSpPr>
+            <a:spLocks noGrp="1"/>
+          </p:cNvSpPr>
+          <p:nvPr>
+            <p:ph type="title"/>
+          </p:nvPr>
+        </p:nvSpPr>
+        <p:spPr/>
+        <p:txBody>
+          <a:bodyPr/>
+          <a:p>
+            <a:endParaRPr lang="es-ES" altLang="en-US"/>
+          </a:p>
+        </p:txBody>
+      </p:sp>
+      <p:sp>
+        <p:nvSpPr>
+          <p:cNvPr id="3" name="Marcador de posición de texto 2"/>
+          <p:cNvSpPr>
+            <a:spLocks noGrp="1"/>
+          </p:cNvSpPr>
+          <p:nvPr>
+            <p:ph type="body" sz="quarter" idx="13"/>
+          </p:nvPr>
+        </p:nvSpPr>
+        <p:spPr/>
+        <p:txBody>
+          <a:bodyPr/>
+          <a:p>
+            <a:endParaRPr lang="es-ES" altLang="en-US"/>
+          </a:p>
+        </p:txBody>
+      </p:sp>
+      <p:sp>
+        <p:nvSpPr>
+          <p:cNvPr id="5" name="Cuadro de texto 4"/>
+          <p:cNvSpPr txBox="1"/>
+          <p:nvPr/>
+        </p:nvSpPr>
+        <p:spPr>
+          <a:xfrm>
+            <a:off x="831215" y="2120900"/>
+            <a:ext cx="10088880" cy="460375"/>
+          </a:xfrm>
+          <a:prstGeom prst="rect">
+            <a:avLst/>
+          </a:prstGeom>
+          <a:noFill/>
+        </p:spPr>
+        <p:txBody>
+          <a:bodyPr wrap="square" rtlCol="0">
+            <a:spAutoFit/>
+          </a:bodyPr>
+          <a:p>
+            <a:r>
+              <a:rPr lang="es-ES" altLang="en-US"/>
+              <a:t>Workshop</a:t>
+            </a:r>
+            <a:endParaRPr lang="es-ES" altLang="en-US"/>
+          </a:p>
+        </p:txBody>
+      </p:sp>
+    </p:spTree>
+  </p:cSld>
+  <p:clrMapOvr>
+    <a:masterClrMapping/>
+  </p:clrMapOvr>
+</p:sld>
+</file>
+
+<file path=ppt/slides/slide27.xml><?xml version="1.0" encoding="utf-8"?>
 <p:sld xmlns:a="http://schemas.openxmlformats.org/drawingml/2006/main" xmlns:r="http://schemas.openxmlformats.org/officeDocument/2006/relationships" xmlns:p="http://schemas.openxmlformats.org/presentationml/2006/main">
   <p:cSld>
     <p:bg>
@@ -9367,7 +9916,7 @@
 </p:sld>
 </file>
 
-<file path=ppt/slides/slide26.xml><?xml version="1.0" encoding="utf-8"?>
+<file path=ppt/slides/slide28.xml><?xml version="1.0" encoding="utf-8"?>
 <p:sld xmlns:a="http://schemas.openxmlformats.org/drawingml/2006/main" xmlns:r="http://schemas.openxmlformats.org/officeDocument/2006/relationships" xmlns:p="http://schemas.openxmlformats.org/presentationml/2006/main">
   <p:cSld>
     <p:spTree>
@@ -9736,7 +10285,11 @@
         <p:txBody>
           <a:bodyPr/>
           <a:p>
-            <a:endParaRPr lang="en-US"/>
+            <a:r>
+              <a:rPr lang="es-ES" altLang="en-US"/>
+              <a:t>Best Pratices</a:t>
+            </a:r>
+            <a:endParaRPr lang="es-ES" altLang="en-US"/>
           </a:p>
         </p:txBody>
       </p:sp>
@@ -9754,20 +10307,26 @@
         <p:txBody>
           <a:bodyPr/>
           <a:p>
+            <a:r>
+              <a:rPr lang="es-ES" altLang="en-US">
+                <a:sym typeface="+mn-ea"/>
+              </a:rPr>
+              <a:t>Style Guide</a:t>
+            </a:r>
             <a:endParaRPr lang="en-US"/>
           </a:p>
         </p:txBody>
       </p:sp>
       <p:sp>
         <p:nvSpPr>
-          <p:cNvPr id="5" name="Cuadro de texto 4"/>
+          <p:cNvPr id="6" name="Cuadro de texto 5"/>
           <p:cNvSpPr txBox="1"/>
           <p:nvPr/>
         </p:nvSpPr>
         <p:spPr>
           <a:xfrm>
-            <a:off x="631190" y="1884680"/>
-            <a:ext cx="4983480" cy="460375"/>
+            <a:off x="599440" y="4118610"/>
+            <a:ext cx="6774815" cy="1938020"/>
           </a:xfrm>
           <a:prstGeom prst="rect">
             <a:avLst/>
@@ -9781,22 +10340,33 @@
           <a:p>
             <a:r>
               <a:rPr lang="es-ES" altLang="en-US"/>
-              <a:t>Make use of lint rules</a:t>
+              <a:t>The purpose of this style guide is to provide guidance on building Angular applications by showing the conventions I use and, more importantly, why I choose them.</a:t>
             </a:r>
             <a:endParaRPr lang="es-ES" altLang="en-US"/>
           </a:p>
-        </p:txBody>
-      </p:sp>
-      <p:sp>
-        <p:nvSpPr>
-          <p:cNvPr id="6" name="Cuadro de texto 5"/>
+          <a:p>
+            <a:r>
+              <a:rPr lang="es-ES" altLang="en-US"/>
+              <a:t>				</a:t>
+            </a:r>
+            <a:r>
+              <a:rPr lang="es-ES" altLang="en-US" i="1"/>
+              <a:t>Jonh Papa</a:t>
+            </a:r>
+            <a:endParaRPr lang="es-ES" altLang="en-US" i="1"/>
+          </a:p>
+        </p:txBody>
+      </p:sp>
+      <p:sp>
+        <p:nvSpPr>
+          <p:cNvPr id="4" name="Cuadro de texto 3"/>
           <p:cNvSpPr txBox="1"/>
           <p:nvPr/>
         </p:nvSpPr>
         <p:spPr>
           <a:xfrm>
-            <a:off x="631190" y="3249295"/>
-            <a:ext cx="6488430" cy="1568450"/>
+            <a:off x="599440" y="1864360"/>
+            <a:ext cx="8017510" cy="1198880"/>
           </a:xfrm>
           <a:prstGeom prst="rect">
             <a:avLst/>
@@ -9810,7 +10380,7 @@
           <a:p>
             <a:r>
               <a:rPr lang="es-ES" altLang="en-US"/>
-              <a:t>Having lint rules in place means that you will get a nice error when you are doing something that you should not be. This will enforce consistency in your application and readability.</a:t>
+              <a:t>A style guide is a set of standards for the writing and design of documents, either for general use or for a specific publication, organization, or field.</a:t>
             </a:r>
             <a:endParaRPr lang="es-ES" altLang="en-US"/>
           </a:p>
@@ -9836,7 +10406,7 @@
       <p:grpSpPr/>
       <p:sp>
         <p:nvSpPr>
-          <p:cNvPr id="2" name="Title 1"/>
+          <p:cNvPr id="2" name="Título 1"/>
           <p:cNvSpPr>
             <a:spLocks noGrp="1"/>
           </p:cNvSpPr>
@@ -9850,7 +10420,7 @@
           <a:p>
             <a:r>
               <a:rPr lang="es-ES" altLang="en-US"/>
-              <a:t>Style Guide</a:t>
+              <a:t>Linter</a:t>
             </a:r>
             <a:endParaRPr lang="es-ES" altLang="en-US"/>
           </a:p>
@@ -9858,7 +10428,7 @@
       </p:sp>
       <p:sp>
         <p:nvSpPr>
-          <p:cNvPr id="3" name="Text Placeholder 2"/>
+          <p:cNvPr id="3" name="Marcador de posición de texto 2"/>
           <p:cNvSpPr>
             <a:spLocks noGrp="1"/>
           </p:cNvSpPr>
@@ -9871,23 +10441,23 @@
           <a:bodyPr/>
           <a:p>
             <a:r>
-              <a:rPr lang="en-US"/>
-              <a:t>Ru</a:t>
-            </a:r>
-            <a:endParaRPr lang="en-US"/>
-          </a:p>
-        </p:txBody>
-      </p:sp>
-      <p:sp>
-        <p:nvSpPr>
-          <p:cNvPr id="6" name="Cuadro de texto 5"/>
+              <a:rPr lang="es-ES" altLang="en-US"/>
+              <a:t>What is</a:t>
+            </a:r>
+            <a:endParaRPr lang="es-ES" altLang="en-US"/>
+          </a:p>
+        </p:txBody>
+      </p:sp>
+      <p:sp>
+        <p:nvSpPr>
+          <p:cNvPr id="4" name="Cuadro de texto 3"/>
           <p:cNvSpPr txBox="1"/>
           <p:nvPr/>
         </p:nvSpPr>
         <p:spPr>
           <a:xfrm>
-            <a:off x="630555" y="2020570"/>
-            <a:ext cx="6774815" cy="1938020"/>
+            <a:off x="1146175" y="1603375"/>
+            <a:ext cx="8701405" cy="1198880"/>
           </a:xfrm>
           <a:prstGeom prst="rect">
             <a:avLst/>
@@ -9901,23 +10471,51 @@
           <a:p>
             <a:r>
               <a:rPr lang="es-ES" altLang="en-US"/>
-              <a:t>The purpose of this style guide is to provide guidance on building Angular applications by showing the conventions I use and, more importantly, why I choose them.</a:t>
+              <a:t>A linter or lint refers to tools that analyze source code to flag programming errors, bugs, stylistic errors, and suspicious constructs.</a:t>
             </a:r>
             <a:endParaRPr lang="es-ES" altLang="en-US"/>
           </a:p>
           <a:p>
             <a:r>
               <a:rPr lang="es-ES" altLang="en-US"/>
-              <a:t>				</a:t>
-            </a:r>
-            <a:r>
-              <a:rPr lang="es-ES" altLang="en-US" i="1"/>
-              <a:t>Jonh Papa</a:t>
-            </a:r>
-            <a:endParaRPr lang="es-ES" altLang="en-US" i="1"/>
-          </a:p>
-        </p:txBody>
-      </p:sp>
+              <a:t> 					 </a:t>
+            </a:r>
+            <a:endParaRPr lang="es-ES" altLang="en-US">
+              <a:effectLst>
+                <a:outerShdw blurRad="38100" dist="38100" dir="2700000" algn="tl">
+                  <a:srgbClr val="000000">
+                    <a:alpha val="43137"/>
+                  </a:srgbClr>
+                </a:outerShdw>
+              </a:effectLst>
+            </a:endParaRPr>
+          </a:p>
+        </p:txBody>
+      </p:sp>
+      <p:pic>
+        <p:nvPicPr>
+          <p:cNvPr id="5" name="Imagen 4" descr="linter"/>
+          <p:cNvPicPr>
+            <a:picLocks noChangeAspect="1"/>
+          </p:cNvPicPr>
+          <p:nvPr/>
+        </p:nvPicPr>
+        <p:blipFill>
+          <a:blip r:embed="rId1"/>
+          <a:stretch>
+            <a:fillRect/>
+          </a:stretch>
+        </p:blipFill>
+        <p:spPr>
+          <a:xfrm>
+            <a:off x="1433195" y="2954655"/>
+            <a:ext cx="9191625" cy="3496945"/>
+          </a:xfrm>
+          <a:prstGeom prst="rect">
+            <a:avLst/>
+          </a:prstGeom>
+        </p:spPr>
+      </p:pic>
     </p:spTree>
   </p:cSld>
   <p:clrMapOvr>
@@ -9951,10 +10549,12 @@
           <a:bodyPr/>
           <a:p>
             <a:r>
-              <a:rPr lang="es-ES" altLang="en-US"/>
-              <a:t>TsLint</a:t>
-            </a:r>
-            <a:endParaRPr lang="es-ES" altLang="en-US"/>
+              <a:rPr lang="es-ES" altLang="en-US">
+                <a:sym typeface="+mn-ea"/>
+              </a:rPr>
+              <a:t>Linter</a:t>
+            </a:r>
+            <a:endParaRPr lang="en-US"/>
           </a:p>
         </p:txBody>
       </p:sp>
@@ -9968,18 +10568,13 @@
             <p:ph type="body" sz="quarter" idx="13"/>
           </p:nvPr>
         </p:nvSpPr>
-        <p:spPr>
-          <a:xfrm>
-            <a:off x="299400" y="767382"/>
-            <a:ext cx="6228401" cy="513014"/>
-          </a:xfrm>
-        </p:spPr>
+        <p:spPr/>
         <p:txBody>
           <a:bodyPr/>
           <a:p>
             <a:r>
               <a:rPr lang="es-ES" altLang="en-US"/>
-              <a:t>What its</a:t>
+              <a:t>Linter Rules </a:t>
             </a:r>
             <a:endParaRPr lang="es-ES" altLang="en-US"/>
           </a:p>
@@ -9987,14 +10582,14 @@
       </p:sp>
       <p:sp>
         <p:nvSpPr>
-          <p:cNvPr id="4" name="Cuadro de texto 3"/>
+          <p:cNvPr id="5" name="Cuadro de texto 4"/>
           <p:cNvSpPr txBox="1"/>
           <p:nvPr/>
         </p:nvSpPr>
         <p:spPr>
           <a:xfrm>
-            <a:off x="6170295" y="5168900"/>
-            <a:ext cx="5313680" cy="829945"/>
+            <a:off x="631190" y="1884680"/>
+            <a:ext cx="4983480" cy="460375"/>
           </a:xfrm>
           <a:prstGeom prst="rect">
             <a:avLst/>
@@ -10008,14 +10603,36 @@
           <a:p>
             <a:r>
               <a:rPr lang="es-ES" altLang="en-US"/>
-              <a:t>Rules:</a:t>
+              <a:t>Make use of lint rules</a:t>
             </a:r>
             <a:endParaRPr lang="es-ES" altLang="en-US"/>
           </a:p>
+        </p:txBody>
+      </p:sp>
+      <p:sp>
+        <p:nvSpPr>
+          <p:cNvPr id="6" name="Cuadro de texto 5"/>
+          <p:cNvSpPr txBox="1"/>
+          <p:nvPr/>
+        </p:nvSpPr>
+        <p:spPr>
+          <a:xfrm>
+            <a:off x="631190" y="3249295"/>
+            <a:ext cx="6488430" cy="1568450"/>
+          </a:xfrm>
+          <a:prstGeom prst="rect">
+            <a:avLst/>
+          </a:prstGeom>
+          <a:noFill/>
+        </p:spPr>
+        <p:txBody>
+          <a:bodyPr wrap="square" rtlCol="0" anchor="t">
+            <a:spAutoFit/>
+          </a:bodyPr>
           <a:p>
             <a:r>
               <a:rPr lang="es-ES" altLang="en-US"/>
-              <a:t>https://palantir.github.io/tslint/rules/</a:t>
+              <a:t>Having lint rules in place means that you will get a nice error when you are doing something that you should not be. This will enforce consistency in your application and readability.</a:t>
             </a:r>
             <a:endParaRPr lang="es-ES" altLang="en-US"/>
           </a:p>
@@ -10023,7 +10640,7 @@
       </p:sp>
       <p:pic>
         <p:nvPicPr>
-          <p:cNvPr id="5" name="Imagen 4" descr="tslint"/>
+          <p:cNvPr id="4" name="Imagen 3" descr="farol-rojo-para-vela"/>
           <p:cNvPicPr>
             <a:picLocks noChangeAspect="1"/>
           </p:cNvPicPr>
@@ -10037,69 +10654,8 @@
         </p:blipFill>
         <p:spPr>
           <a:xfrm>
-            <a:off x="6099175" y="1747520"/>
-            <a:ext cx="5621020" cy="3177540"/>
-          </a:xfrm>
-          <a:prstGeom prst="rect">
-            <a:avLst/>
-          </a:prstGeom>
-        </p:spPr>
-      </p:pic>
-      <p:sp>
-        <p:nvSpPr>
-          <p:cNvPr id="11" name="Cuadro de texto 10"/>
-          <p:cNvSpPr txBox="1"/>
-          <p:nvPr/>
-        </p:nvSpPr>
-        <p:spPr>
-          <a:xfrm>
-            <a:off x="365760" y="3363595"/>
-            <a:ext cx="5461635" cy="1198880"/>
-          </a:xfrm>
-          <a:prstGeom prst="rect">
-            <a:avLst/>
-          </a:prstGeom>
-          <a:noFill/>
-        </p:spPr>
-        <p:txBody>
-          <a:bodyPr wrap="square" rtlCol="0" anchor="t">
-            <a:spAutoFit/>
-          </a:bodyPr>
-          <a:p>
-            <a:r>
-              <a:rPr lang="es-ES" altLang="en-US">
-                <a:solidFill>
-                  <a:schemeClr val="tx1"/>
-                </a:solidFill>
-              </a:rPr>
-              <a:t>TSLint is an extensible static analysis tool that checks TypeScript code for readability, maintainability, and functionality errors. </a:t>
-            </a:r>
-            <a:endParaRPr lang="es-ES" altLang="en-US">
-              <a:solidFill>
-                <a:schemeClr val="tx1"/>
-              </a:solidFill>
-            </a:endParaRPr>
-          </a:p>
-        </p:txBody>
-      </p:sp>
-      <p:pic>
-        <p:nvPicPr>
-          <p:cNvPr id="12" name="Imagen 11" descr="TSLint_icon"/>
-          <p:cNvPicPr>
-            <a:picLocks noChangeAspect="1"/>
-          </p:cNvPicPr>
-          <p:nvPr/>
-        </p:nvPicPr>
-        <p:blipFill>
-          <a:blip r:embed="rId2"/>
-          <a:stretch>
-            <a:fillRect/>
-          </a:stretch>
-        </p:blipFill>
-        <p:spPr>
-          <a:xfrm>
-            <a:off x="2199005" y="1867535"/>
-            <a:ext cx="1259205" cy="1259205"/>
+            <a:off x="7274560" y="1762125"/>
+            <a:ext cx="4379595" cy="4379595"/>
           </a:xfrm>
           <a:prstGeom prst="rect">
             <a:avLst/>
@@ -10123,17 +10679,10 @@
         <p:cNvGrpSpPr/>
         <p:nvPr/>
       </p:nvGrpSpPr>
-      <p:grpSpPr>
-        <a:xfrm>
-          <a:off x="0" y="0"/>
-          <a:ext cx="0" cy="0"/>
-          <a:chOff x="0" y="0"/>
-          <a:chExt cx="0" cy="0"/>
-        </a:xfrm>
-      </p:grpSpPr>
-      <p:sp>
-        <p:nvSpPr>
-          <p:cNvPr id="2" name="Título 1"/>
+      <p:grpSpPr/>
+      <p:sp>
+        <p:nvSpPr>
+          <p:cNvPr id="2" name="Title 1"/>
           <p:cNvSpPr>
             <a:spLocks noGrp="1"/>
           </p:cNvSpPr>
@@ -10144,16 +10693,163 @@
         <p:spPr/>
         <p:txBody>
           <a:bodyPr/>
-          <a:lstStyle/>
-          <a:p>
-            <a:r>
-              <a:rPr lang="es-ES" dirty="0" err="1"/>
-              <a:t>Apariencia</a:t>
-            </a:r>
-            <a:endParaRPr lang="es-ES" dirty="0"/>
-          </a:p>
-        </p:txBody>
-      </p:sp>
+          <a:p>
+            <a:r>
+              <a:rPr lang="es-ES" altLang="en-US"/>
+              <a:t>TsLint</a:t>
+            </a:r>
+            <a:endParaRPr lang="es-ES" altLang="en-US"/>
+          </a:p>
+        </p:txBody>
+      </p:sp>
+      <p:sp>
+        <p:nvSpPr>
+          <p:cNvPr id="3" name="Text Placeholder 2"/>
+          <p:cNvSpPr>
+            <a:spLocks noGrp="1"/>
+          </p:cNvSpPr>
+          <p:nvPr>
+            <p:ph type="body" sz="quarter" idx="13"/>
+          </p:nvPr>
+        </p:nvSpPr>
+        <p:spPr>
+          <a:xfrm>
+            <a:off x="299400" y="767382"/>
+            <a:ext cx="6228401" cy="513014"/>
+          </a:xfrm>
+        </p:spPr>
+        <p:txBody>
+          <a:bodyPr/>
+          <a:p>
+            <a:r>
+              <a:rPr lang="es-ES" altLang="en-US"/>
+              <a:t>What its</a:t>
+            </a:r>
+            <a:endParaRPr lang="es-ES" altLang="en-US"/>
+          </a:p>
+        </p:txBody>
+      </p:sp>
+      <p:sp>
+        <p:nvSpPr>
+          <p:cNvPr id="4" name="Cuadro de texto 3"/>
+          <p:cNvSpPr txBox="1"/>
+          <p:nvPr/>
+        </p:nvSpPr>
+        <p:spPr>
+          <a:xfrm>
+            <a:off x="6170295" y="5168900"/>
+            <a:ext cx="5313680" cy="829945"/>
+          </a:xfrm>
+          <a:prstGeom prst="rect">
+            <a:avLst/>
+          </a:prstGeom>
+          <a:noFill/>
+        </p:spPr>
+        <p:txBody>
+          <a:bodyPr wrap="square" rtlCol="0" anchor="t">
+            <a:spAutoFit/>
+          </a:bodyPr>
+          <a:p>
+            <a:r>
+              <a:rPr lang="es-ES" altLang="en-US"/>
+              <a:t>Rules:</a:t>
+            </a:r>
+            <a:endParaRPr lang="es-ES" altLang="en-US"/>
+          </a:p>
+          <a:p>
+            <a:r>
+              <a:rPr lang="es-ES" altLang="en-US"/>
+              <a:t>https://palantir.github.io/tslint/rules/</a:t>
+            </a:r>
+            <a:endParaRPr lang="es-ES" altLang="en-US"/>
+          </a:p>
+        </p:txBody>
+      </p:sp>
+      <p:pic>
+        <p:nvPicPr>
+          <p:cNvPr id="5" name="Imagen 4" descr="tslint"/>
+          <p:cNvPicPr>
+            <a:picLocks noChangeAspect="1"/>
+          </p:cNvPicPr>
+          <p:nvPr/>
+        </p:nvPicPr>
+        <p:blipFill>
+          <a:blip r:embed="rId1"/>
+          <a:stretch>
+            <a:fillRect/>
+          </a:stretch>
+        </p:blipFill>
+        <p:spPr>
+          <a:xfrm>
+            <a:off x="6099175" y="1747520"/>
+            <a:ext cx="5621020" cy="3177540"/>
+          </a:xfrm>
+          <a:prstGeom prst="rect">
+            <a:avLst/>
+          </a:prstGeom>
+        </p:spPr>
+      </p:pic>
+      <p:sp>
+        <p:nvSpPr>
+          <p:cNvPr id="11" name="Cuadro de texto 10"/>
+          <p:cNvSpPr txBox="1"/>
+          <p:nvPr/>
+        </p:nvSpPr>
+        <p:spPr>
+          <a:xfrm>
+            <a:off x="365760" y="3363595"/>
+            <a:ext cx="5461635" cy="1198880"/>
+          </a:xfrm>
+          <a:prstGeom prst="rect">
+            <a:avLst/>
+          </a:prstGeom>
+          <a:noFill/>
+        </p:spPr>
+        <p:txBody>
+          <a:bodyPr wrap="square" rtlCol="0" anchor="t">
+            <a:spAutoFit/>
+          </a:bodyPr>
+          <a:p>
+            <a:r>
+              <a:rPr lang="es-ES" altLang="en-US">
+                <a:solidFill>
+                  <a:schemeClr val="tx1"/>
+                </a:solidFill>
+              </a:rPr>
+              <a:t>TSLint is an extensible static analysis tool that checks TypeScript code for readability, maintainability, and functionality errors. </a:t>
+            </a:r>
+            <a:endParaRPr lang="es-ES" altLang="en-US">
+              <a:solidFill>
+                <a:schemeClr val="tx1"/>
+              </a:solidFill>
+            </a:endParaRPr>
+          </a:p>
+        </p:txBody>
+      </p:sp>
+      <p:pic>
+        <p:nvPicPr>
+          <p:cNvPr id="12" name="Imagen 11" descr="TSLint_icon"/>
+          <p:cNvPicPr>
+            <a:picLocks noChangeAspect="1"/>
+          </p:cNvPicPr>
+          <p:nvPr/>
+        </p:nvPicPr>
+        <p:blipFill>
+          <a:blip r:embed="rId2"/>
+          <a:stretch>
+            <a:fillRect/>
+          </a:stretch>
+        </p:blipFill>
+        <p:spPr>
+          <a:xfrm>
+            <a:off x="2199005" y="1867535"/>
+            <a:ext cx="1259205" cy="1259205"/>
+          </a:xfrm>
+          <a:prstGeom prst="rect">
+            <a:avLst/>
+          </a:prstGeom>
+        </p:spPr>
+      </p:pic>
     </p:spTree>
   </p:cSld>
   <p:clrMapOvr>
@@ -10171,10 +10867,17 @@
         <p:cNvGrpSpPr/>
         <p:nvPr/>
       </p:nvGrpSpPr>
-      <p:grpSpPr/>
-      <p:sp>
-        <p:nvSpPr>
-          <p:cNvPr id="2" name="Title 1"/>
+      <p:grpSpPr>
+        <a:xfrm>
+          <a:off x="0" y="0"/>
+          <a:ext cx="0" cy="0"/>
+          <a:chOff x="0" y="0"/>
+          <a:chExt cx="0" cy="0"/>
+        </a:xfrm>
+      </p:grpSpPr>
+      <p:sp>
+        <p:nvSpPr>
+          <p:cNvPr id="2" name="Título 1"/>
           <p:cNvSpPr>
             <a:spLocks noGrp="1"/>
           </p:cNvSpPr>
@@ -10182,50 +10885,36 @@
             <p:ph type="title"/>
           </p:nvPr>
         </p:nvSpPr>
-        <p:spPr/>
-        <p:txBody>
-          <a:bodyPr/>
-          <a:p>
-            <a:r>
-              <a:rPr lang="es-ES" altLang="en-US"/>
-              <a:t>TsLint</a:t>
-            </a:r>
-            <a:endParaRPr lang="es-ES" altLang="en-US"/>
-          </a:p>
-        </p:txBody>
-      </p:sp>
-      <p:sp>
-        <p:nvSpPr>
-          <p:cNvPr id="3" name="Text Placeholder 2"/>
-          <p:cNvSpPr>
-            <a:spLocks noGrp="1"/>
-          </p:cNvSpPr>
-          <p:nvPr>
-            <p:ph type="body" sz="quarter" idx="13"/>
-          </p:nvPr>
-        </p:nvSpPr>
-        <p:spPr/>
-        <p:txBody>
-          <a:bodyPr/>
-          <a:p>
-            <a:r>
-              <a:rPr lang="en-US"/>
-              <a:t>Rule: indent</a:t>
-            </a:r>
-            <a:endParaRPr lang="en-US"/>
-          </a:p>
-        </p:txBody>
-      </p:sp>
-      <p:sp>
-        <p:nvSpPr>
-          <p:cNvPr id="4" name="Text Box 3"/>
+        <p:spPr>
+          <a:xfrm>
+            <a:off x="3228340" y="2366010"/>
+            <a:ext cx="5735320" cy="859155"/>
+          </a:xfrm>
+        </p:spPr>
+        <p:txBody>
+          <a:bodyPr>
+            <a:normAutofit fontScale="90000"/>
+          </a:bodyPr>
+          <a:lstStyle/>
+          <a:p>
+            <a:r>
+              <a:rPr lang="es-ES" dirty="0" err="1"/>
+              <a:t>TypeScript-specific</a:t>
+            </a:r>
+            <a:endParaRPr lang="es-ES" dirty="0" err="1"/>
+          </a:p>
+        </p:txBody>
+      </p:sp>
+      <p:sp>
+        <p:nvSpPr>
+          <p:cNvPr id="3" name="Cuadro de texto 2"/>
           <p:cNvSpPr txBox="1"/>
           <p:nvPr/>
         </p:nvSpPr>
         <p:spPr>
           <a:xfrm>
-            <a:off x="299085" y="1466215"/>
-            <a:ext cx="5920740" cy="460375"/>
+            <a:off x="1864360" y="5333365"/>
+            <a:ext cx="6759575" cy="460375"/>
           </a:xfrm>
           <a:prstGeom prst="rect">
             <a:avLst/>
@@ -10238,39 +10927,18 @@
           </a:bodyPr>
           <a:p>
             <a:r>
-              <a:rPr lang="en-US"/>
-              <a:t>Enforces indentation with tabs or spaces.</a:t>
-            </a:r>
-            <a:endParaRPr lang="en-US"/>
-          </a:p>
-        </p:txBody>
-      </p:sp>
-      <p:sp>
-        <p:nvSpPr>
-          <p:cNvPr id="5" name="Text Box 4"/>
-          <p:cNvSpPr txBox="1"/>
-          <p:nvPr/>
-        </p:nvSpPr>
-        <p:spPr>
-          <a:xfrm>
-            <a:off x="299085" y="4681220"/>
-            <a:ext cx="11640185" cy="829945"/>
-          </a:xfrm>
-          <a:prstGeom prst="rect">
-            <a:avLst/>
-          </a:prstGeom>
-          <a:noFill/>
-        </p:spPr>
-        <p:txBody>
-          <a:bodyPr wrap="square" rtlCol="0" anchor="t">
-            <a:spAutoFit/>
-          </a:bodyPr>
-          <a:p>
-            <a:r>
-              <a:rPr lang="en-US"/>
-              <a:t>Using only one of tabs or spaces for indentation leads to more consistent editor behavior, cleaner diffs in version control, and easier programmatic manipulation.</a:t>
-            </a:r>
-            <a:endParaRPr lang="en-US"/>
+              <a:rPr lang="es-ES" altLang="en-US">
+                <a:solidFill>
+                  <a:schemeClr val="bg1"/>
+                </a:solidFill>
+              </a:rPr>
+              <a:t>These rules find errors related to TypeScript features</a:t>
+            </a:r>
+            <a:endParaRPr lang="es-ES" altLang="en-US">
+              <a:solidFill>
+                <a:schemeClr val="bg1"/>
+              </a:solidFill>
+            </a:endParaRPr>
           </a:p>
         </p:txBody>
       </p:sp>

</xml_diff>